<commit_message>
Update An Analytical Placement Algorithm with Routing topology Optimization.pptx
</commit_message>
<xml_diff>
--- a/GM/Placement/An Analytical Placement Algorithm with Routing topology Optimization/An Analytical Placement Algorithm with Routing topology Optimization.pptx
+++ b/GM/Placement/An Analytical Placement Algorithm with Routing topology Optimization/An Analytical Placement Algorithm with Routing topology Optimization.pptx
@@ -5,7 +5,7 @@
     <p:sldMasterId id="2147483648" r:id="rId1"/>
   </p:sldMasterIdLst>
   <p:notesMasterIdLst>
-    <p:notesMasterId r:id="rId9"/>
+    <p:notesMasterId r:id="rId15"/>
   </p:notesMasterIdLst>
   <p:sldIdLst>
     <p:sldId id="256" r:id="rId2"/>
@@ -14,7 +14,13 @@
     <p:sldId id="302" r:id="rId5"/>
     <p:sldId id="303" r:id="rId6"/>
     <p:sldId id="301" r:id="rId7"/>
-    <p:sldId id="298" r:id="rId8"/>
+    <p:sldId id="304" r:id="rId8"/>
+    <p:sldId id="305" r:id="rId9"/>
+    <p:sldId id="306" r:id="rId10"/>
+    <p:sldId id="307" r:id="rId11"/>
+    <p:sldId id="308" r:id="rId12"/>
+    <p:sldId id="309" r:id="rId13"/>
+    <p:sldId id="298" r:id="rId14"/>
   </p:sldIdLst>
   <p:sldSz cx="12192000" cy="6858000"/>
   <p:notesSz cx="6858000" cy="9144000"/>
@@ -1459,7 +1465,7 @@
           <a:p>
             <a:fld id="{C9ED61FB-B9B0-4D85-A72E-A614C28ECC4E}" type="datetimeFigureOut">
               <a:rPr lang="en-US" smtClean="0"/>
-              <a:t>3/8/2024</a:t>
+              <a:t>3/11/2024</a:t>
             </a:fld>
             <a:endParaRPr lang="en-US"/>
           </a:p>
@@ -1948,12 +1954,8 @@
               <a:t>因為她的</a:t>
             </a:r>
             <a:r>
-              <a:rPr lang="en-US" altLang="zh-TW" dirty="0" err="1"/>
-              <a:t>steiner</a:t>
-            </a:r>
-            <a:r>
               <a:rPr lang="en-US" altLang="zh-TW" dirty="0"/>
-              <a:t> tree</a:t>
+              <a:t>steiner tree</a:t>
             </a:r>
             <a:r>
               <a:rPr lang="zh-TW" altLang="en-US" dirty="0"/>
@@ -2210,6 +2212,789 @@
     <p:extLst>
       <p:ext uri="{BB962C8B-B14F-4D97-AF65-F5344CB8AC3E}">
         <p14:creationId xmlns:p14="http://schemas.microsoft.com/office/powerpoint/2010/main" val="2192857030"/>
+      </p:ext>
+    </p:extLst>
+  </p:cSld>
+  <p:clrMapOvr>
+    <a:masterClrMapping/>
+  </p:clrMapOvr>
+</p:notes>
+</file>
+
+<file path=ppt/notesSlides/notesSlide4.xml><?xml version="1.0" encoding="utf-8"?>
+<p:notes xmlns:a="http://schemas.openxmlformats.org/drawingml/2006/main" xmlns:r="http://schemas.openxmlformats.org/officeDocument/2006/relationships" xmlns:p="http://schemas.openxmlformats.org/presentationml/2006/main">
+  <p:cSld>
+    <p:spTree>
+      <p:nvGrpSpPr>
+        <p:cNvPr id="1" name=""/>
+        <p:cNvGrpSpPr/>
+        <p:nvPr/>
+      </p:nvGrpSpPr>
+      <p:grpSpPr>
+        <a:xfrm>
+          <a:off x="0" y="0"/>
+          <a:ext cx="0" cy="0"/>
+          <a:chOff x="0" y="0"/>
+          <a:chExt cx="0" cy="0"/>
+        </a:xfrm>
+      </p:grpSpPr>
+      <p:sp>
+        <p:nvSpPr>
+          <p:cNvPr id="2" name="投影片影像版面配置區 1"/>
+          <p:cNvSpPr>
+            <a:spLocks noGrp="1" noRot="1" noChangeAspect="1"/>
+          </p:cNvSpPr>
+          <p:nvPr>
+            <p:ph type="sldImg"/>
+          </p:nvPr>
+        </p:nvSpPr>
+        <p:spPr/>
+      </p:sp>
+      <p:sp>
+        <p:nvSpPr>
+          <p:cNvPr id="3" name="備忘稿版面配置區 2"/>
+          <p:cNvSpPr>
+            <a:spLocks noGrp="1"/>
+          </p:cNvSpPr>
+          <p:nvPr>
+            <p:ph type="body" idx="1"/>
+          </p:nvPr>
+        </p:nvSpPr>
+        <p:spPr/>
+        <p:txBody>
+          <a:bodyPr/>
+          <a:lstStyle/>
+          <a:p>
+            <a:pPr marL="171450" indent="-171450">
+              <a:buFont typeface="Arial" panose="020B0604020202020204" pitchFamily="34" charset="0"/>
+              <a:buChar char="•"/>
+            </a:pPr>
+            <a:r>
+              <a:rPr lang="en-US" altLang="zh-TW" dirty="0"/>
+              <a:t>(b)</a:t>
+            </a:r>
+            <a:r>
+              <a:rPr lang="zh-TW" altLang="en-US" dirty="0"/>
+              <a:t>圖中的綠色箭頭是</a:t>
+            </a:r>
+            <a:r>
+              <a:rPr lang="en-US" altLang="zh-TW" dirty="0"/>
+              <a:t>HPWL Model</a:t>
+            </a:r>
+            <a:r>
+              <a:rPr lang="zh-TW" altLang="en-US" dirty="0"/>
+              <a:t>的</a:t>
+            </a:r>
+            <a:r>
+              <a:rPr lang="en-US" altLang="zh-TW" dirty="0"/>
+              <a:t>wirelength gradient (</a:t>
+            </a:r>
+            <a:r>
+              <a:rPr lang="zh-TW" altLang="en-US" dirty="0"/>
+              <a:t>只有</a:t>
+            </a:r>
+            <a:r>
+              <a:rPr lang="en-US" altLang="zh-TW" dirty="0"/>
+              <a:t>p1,p2,p4,p6</a:t>
+            </a:r>
+            <a:r>
+              <a:rPr lang="zh-TW" altLang="en-US" dirty="0"/>
+              <a:t>有，其他的</a:t>
+            </a:r>
+            <a:r>
+              <a:rPr lang="en-US" altLang="zh-TW" dirty="0"/>
+              <a:t>interior point </a:t>
+            </a:r>
+            <a:r>
+              <a:rPr lang="zh-TW" altLang="en-US" dirty="0"/>
+              <a:t>沒有</a:t>
+            </a:r>
+            <a:r>
+              <a:rPr lang="en-US" altLang="zh-TW" dirty="0"/>
+              <a:t>)</a:t>
+            </a:r>
+            <a:endParaRPr lang="zh-TW" altLang="en-US" dirty="0"/>
+          </a:p>
+        </p:txBody>
+      </p:sp>
+      <p:sp>
+        <p:nvSpPr>
+          <p:cNvPr id="4" name="投影片編號版面配置區 3"/>
+          <p:cNvSpPr>
+            <a:spLocks noGrp="1"/>
+          </p:cNvSpPr>
+          <p:nvPr>
+            <p:ph type="sldNum" sz="quarter" idx="5"/>
+          </p:nvPr>
+        </p:nvSpPr>
+        <p:spPr/>
+        <p:txBody>
+          <a:bodyPr/>
+          <a:lstStyle/>
+          <a:p>
+            <a:fld id="{9D457EAB-1485-47AD-BEAD-484FAEBF5A54}" type="slidenum">
+              <a:rPr lang="en-US" smtClean="0"/>
+              <a:t>6</a:t>
+            </a:fld>
+            <a:endParaRPr lang="en-US"/>
+          </a:p>
+        </p:txBody>
+      </p:sp>
+    </p:spTree>
+    <p:extLst>
+      <p:ext uri="{BB962C8B-B14F-4D97-AF65-F5344CB8AC3E}">
+        <p14:creationId xmlns:p14="http://schemas.microsoft.com/office/powerpoint/2010/main" val="1883612593"/>
+      </p:ext>
+    </p:extLst>
+  </p:cSld>
+  <p:clrMapOvr>
+    <a:masterClrMapping/>
+  </p:clrMapOvr>
+</p:notes>
+</file>
+
+<file path=ppt/notesSlides/notesSlide5.xml><?xml version="1.0" encoding="utf-8"?>
+<p:notes xmlns:a="http://schemas.openxmlformats.org/drawingml/2006/main" xmlns:r="http://schemas.openxmlformats.org/officeDocument/2006/relationships" xmlns:p="http://schemas.openxmlformats.org/presentationml/2006/main">
+  <p:cSld>
+    <p:spTree>
+      <p:nvGrpSpPr>
+        <p:cNvPr id="1" name=""/>
+        <p:cNvGrpSpPr/>
+        <p:nvPr/>
+      </p:nvGrpSpPr>
+      <p:grpSpPr>
+        <a:xfrm>
+          <a:off x="0" y="0"/>
+          <a:ext cx="0" cy="0"/>
+          <a:chOff x="0" y="0"/>
+          <a:chExt cx="0" cy="0"/>
+        </a:xfrm>
+      </p:grpSpPr>
+      <p:sp>
+        <p:nvSpPr>
+          <p:cNvPr id="2" name="投影片影像版面配置區 1"/>
+          <p:cNvSpPr>
+            <a:spLocks noGrp="1" noRot="1" noChangeAspect="1"/>
+          </p:cNvSpPr>
+          <p:nvPr>
+            <p:ph type="sldImg"/>
+          </p:nvPr>
+        </p:nvSpPr>
+        <p:spPr/>
+      </p:sp>
+      <p:sp>
+        <p:nvSpPr>
+          <p:cNvPr id="3" name="備忘稿版面配置區 2"/>
+          <p:cNvSpPr>
+            <a:spLocks noGrp="1"/>
+          </p:cNvSpPr>
+          <p:nvPr>
+            <p:ph type="body" idx="1"/>
+          </p:nvPr>
+        </p:nvSpPr>
+        <p:spPr/>
+        <p:txBody>
+          <a:bodyPr/>
+          <a:lstStyle/>
+          <a:p>
+            <a:endParaRPr lang="zh-TW" altLang="en-US" dirty="0"/>
+          </a:p>
+        </p:txBody>
+      </p:sp>
+      <p:sp>
+        <p:nvSpPr>
+          <p:cNvPr id="4" name="投影片編號版面配置區 3"/>
+          <p:cNvSpPr>
+            <a:spLocks noGrp="1"/>
+          </p:cNvSpPr>
+          <p:nvPr>
+            <p:ph type="sldNum" sz="quarter" idx="5"/>
+          </p:nvPr>
+        </p:nvSpPr>
+        <p:spPr/>
+        <p:txBody>
+          <a:bodyPr/>
+          <a:lstStyle/>
+          <a:p>
+            <a:fld id="{9D457EAB-1485-47AD-BEAD-484FAEBF5A54}" type="slidenum">
+              <a:rPr lang="en-US" smtClean="0"/>
+              <a:t>7</a:t>
+            </a:fld>
+            <a:endParaRPr lang="en-US"/>
+          </a:p>
+        </p:txBody>
+      </p:sp>
+    </p:spTree>
+    <p:extLst>
+      <p:ext uri="{BB962C8B-B14F-4D97-AF65-F5344CB8AC3E}">
+        <p14:creationId xmlns:p14="http://schemas.microsoft.com/office/powerpoint/2010/main" val="171829768"/>
+      </p:ext>
+    </p:extLst>
+  </p:cSld>
+  <p:clrMapOvr>
+    <a:masterClrMapping/>
+  </p:clrMapOvr>
+</p:notes>
+</file>
+
+<file path=ppt/notesSlides/notesSlide6.xml><?xml version="1.0" encoding="utf-8"?>
+<p:notes xmlns:a="http://schemas.openxmlformats.org/drawingml/2006/main" xmlns:r="http://schemas.openxmlformats.org/officeDocument/2006/relationships" xmlns:p="http://schemas.openxmlformats.org/presentationml/2006/main">
+  <p:cSld>
+    <p:spTree>
+      <p:nvGrpSpPr>
+        <p:cNvPr id="1" name=""/>
+        <p:cNvGrpSpPr/>
+        <p:nvPr/>
+      </p:nvGrpSpPr>
+      <p:grpSpPr>
+        <a:xfrm>
+          <a:off x="0" y="0"/>
+          <a:ext cx="0" cy="0"/>
+          <a:chOff x="0" y="0"/>
+          <a:chExt cx="0" cy="0"/>
+        </a:xfrm>
+      </p:grpSpPr>
+      <p:sp>
+        <p:nvSpPr>
+          <p:cNvPr id="2" name="投影片影像版面配置區 1"/>
+          <p:cNvSpPr>
+            <a:spLocks noGrp="1" noRot="1" noChangeAspect="1"/>
+          </p:cNvSpPr>
+          <p:nvPr>
+            <p:ph type="sldImg"/>
+          </p:nvPr>
+        </p:nvSpPr>
+        <p:spPr/>
+      </p:sp>
+      <p:sp>
+        <p:nvSpPr>
+          <p:cNvPr id="3" name="備忘稿版面配置區 2"/>
+          <p:cNvSpPr>
+            <a:spLocks noGrp="1"/>
+          </p:cNvSpPr>
+          <p:nvPr>
+            <p:ph type="body" idx="1"/>
+          </p:nvPr>
+        </p:nvSpPr>
+        <p:spPr/>
+        <p:txBody>
+          <a:bodyPr/>
+          <a:lstStyle/>
+          <a:p>
+            <a:endParaRPr lang="zh-TW" altLang="en-US" dirty="0"/>
+          </a:p>
+        </p:txBody>
+      </p:sp>
+      <p:sp>
+        <p:nvSpPr>
+          <p:cNvPr id="4" name="投影片編號版面配置區 3"/>
+          <p:cNvSpPr>
+            <a:spLocks noGrp="1"/>
+          </p:cNvSpPr>
+          <p:nvPr>
+            <p:ph type="sldNum" sz="quarter" idx="5"/>
+          </p:nvPr>
+        </p:nvSpPr>
+        <p:spPr/>
+        <p:txBody>
+          <a:bodyPr/>
+          <a:lstStyle/>
+          <a:p>
+            <a:fld id="{9D457EAB-1485-47AD-BEAD-484FAEBF5A54}" type="slidenum">
+              <a:rPr lang="en-US" smtClean="0"/>
+              <a:t>8</a:t>
+            </a:fld>
+            <a:endParaRPr lang="en-US"/>
+          </a:p>
+        </p:txBody>
+      </p:sp>
+    </p:spTree>
+    <p:extLst>
+      <p:ext uri="{BB962C8B-B14F-4D97-AF65-F5344CB8AC3E}">
+        <p14:creationId xmlns:p14="http://schemas.microsoft.com/office/powerpoint/2010/main" val="4036611091"/>
+      </p:ext>
+    </p:extLst>
+  </p:cSld>
+  <p:clrMapOvr>
+    <a:masterClrMapping/>
+  </p:clrMapOvr>
+</p:notes>
+</file>
+
+<file path=ppt/notesSlides/notesSlide7.xml><?xml version="1.0" encoding="utf-8"?>
+<p:notes xmlns:a="http://schemas.openxmlformats.org/drawingml/2006/main" xmlns:r="http://schemas.openxmlformats.org/officeDocument/2006/relationships" xmlns:p="http://schemas.openxmlformats.org/presentationml/2006/main">
+  <p:cSld>
+    <p:spTree>
+      <p:nvGrpSpPr>
+        <p:cNvPr id="1" name="">
+          <a:extLst>
+            <a:ext uri="{FF2B5EF4-FFF2-40B4-BE49-F238E27FC236}">
+              <a16:creationId xmlns:a16="http://schemas.microsoft.com/office/drawing/2014/main" id="{E2A0994A-0CFC-0200-355D-158873F93103}"/>
+            </a:ext>
+          </a:extLst>
+        </p:cNvPr>
+        <p:cNvGrpSpPr/>
+        <p:nvPr/>
+      </p:nvGrpSpPr>
+      <p:grpSpPr>
+        <a:xfrm>
+          <a:off x="0" y="0"/>
+          <a:ext cx="0" cy="0"/>
+          <a:chOff x="0" y="0"/>
+          <a:chExt cx="0" cy="0"/>
+        </a:xfrm>
+      </p:grpSpPr>
+      <p:sp>
+        <p:nvSpPr>
+          <p:cNvPr id="2" name="投影片影像版面配置區 1">
+            <a:extLst>
+              <a:ext uri="{FF2B5EF4-FFF2-40B4-BE49-F238E27FC236}">
+                <a16:creationId xmlns:a16="http://schemas.microsoft.com/office/drawing/2014/main" id="{F00B6C85-077D-FBE4-DB89-D9B3220BA93F}"/>
+              </a:ext>
+            </a:extLst>
+          </p:cNvPr>
+          <p:cNvSpPr>
+            <a:spLocks noGrp="1" noRot="1" noChangeAspect="1"/>
+          </p:cNvSpPr>
+          <p:nvPr>
+            <p:ph type="sldImg"/>
+          </p:nvPr>
+        </p:nvSpPr>
+        <p:spPr/>
+      </p:sp>
+      <p:sp>
+        <p:nvSpPr>
+          <p:cNvPr id="3" name="備忘稿版面配置區 2">
+            <a:extLst>
+              <a:ext uri="{FF2B5EF4-FFF2-40B4-BE49-F238E27FC236}">
+                <a16:creationId xmlns:a16="http://schemas.microsoft.com/office/drawing/2014/main" id="{F567312F-B314-A3CA-3BAB-1DA5A3724AC3}"/>
+              </a:ext>
+            </a:extLst>
+          </p:cNvPr>
+          <p:cNvSpPr>
+            <a:spLocks noGrp="1"/>
+          </p:cNvSpPr>
+          <p:nvPr>
+            <p:ph type="body" idx="1"/>
+          </p:nvPr>
+        </p:nvSpPr>
+        <p:spPr/>
+        <p:txBody>
+          <a:bodyPr/>
+          <a:lstStyle/>
+          <a:p>
+            <a:pPr marL="285750" indent="-285750" algn="l">
+              <a:buFont typeface="Arial" panose="020B0604020202020204" pitchFamily="34" charset="0"/>
+              <a:buChar char="•"/>
+            </a:pPr>
+            <a:r>
+              <a:rPr lang="zh-TW" altLang="en-US" sz="1800" b="0" i="0" u="none" strike="noStrike" baseline="0" dirty="0">
+                <a:latin typeface="LinLibertineT"/>
+              </a:rPr>
+              <a:t>就是把</a:t>
+            </a:r>
+            <a:r>
+              <a:rPr lang="en-US" altLang="zh-TW" sz="1800" b="0" i="0" u="none" strike="noStrike" baseline="0" dirty="0">
+                <a:latin typeface="LinLibertineT"/>
+              </a:rPr>
+              <a:t>net</a:t>
+            </a:r>
+            <a:r>
+              <a:rPr lang="zh-TW" altLang="en-US" sz="1800" b="0" i="0" u="none" strike="noStrike" baseline="0" dirty="0">
+                <a:latin typeface="LinLibertineT"/>
+              </a:rPr>
+              <a:t>分成</a:t>
+            </a:r>
+            <a:r>
+              <a:rPr lang="en-US" altLang="zh-TW" sz="1800" b="0" i="0" u="none" strike="noStrike" baseline="0" dirty="0">
+                <a:latin typeface="LinLibertineT"/>
+              </a:rPr>
+              <a:t>trunk</a:t>
+            </a:r>
+            <a:r>
+              <a:rPr lang="zh-TW" altLang="en-US" sz="1800" b="0" i="0" u="none" strike="noStrike" baseline="0" dirty="0">
+                <a:latin typeface="LinLibertineT"/>
+              </a:rPr>
+              <a:t>跟</a:t>
+            </a:r>
+            <a:r>
+              <a:rPr lang="en-US" altLang="zh-TW" sz="1800" b="0" i="0" u="none" strike="noStrike" baseline="0" dirty="0">
+                <a:latin typeface="LinLibertineT"/>
+              </a:rPr>
+              <a:t>branch</a:t>
+            </a:r>
+          </a:p>
+          <a:p>
+            <a:pPr marL="285750" indent="-285750" algn="l">
+              <a:buFont typeface="Arial" panose="020B0604020202020204" pitchFamily="34" charset="0"/>
+              <a:buChar char="•"/>
+            </a:pPr>
+            <a:r>
+              <a:rPr lang="zh-TW" altLang="en-US" dirty="0"/>
+              <a:t>利用</a:t>
+            </a:r>
+            <a:r>
+              <a:rPr lang="en-US" altLang="zh-TW" sz="1200" dirty="0">
+                <a:latin typeface="+mj-lt"/>
+              </a:rPr>
+              <a:t>Hybrid wirelength model</a:t>
+            </a:r>
+            <a:r>
+              <a:rPr lang="zh-TW" altLang="en-US" sz="1200" dirty="0">
+                <a:latin typeface="+mj-lt"/>
+              </a:rPr>
+              <a:t>，將</a:t>
+            </a:r>
+            <a:r>
+              <a:rPr lang="en-US" altLang="zh-TW" sz="1200" dirty="0">
+                <a:latin typeface="+mj-lt"/>
+              </a:rPr>
+              <a:t>WA</a:t>
+            </a:r>
+            <a:r>
+              <a:rPr lang="zh-TW" altLang="en-US" sz="1200" dirty="0">
+                <a:latin typeface="+mj-lt"/>
+              </a:rPr>
+              <a:t> </a:t>
+            </a:r>
+            <a:r>
+              <a:rPr lang="en-US" altLang="zh-TW" sz="1200" dirty="0">
+                <a:latin typeface="+mj-lt"/>
+              </a:rPr>
+              <a:t>model</a:t>
+            </a:r>
+            <a:r>
+              <a:rPr lang="zh-TW" altLang="en-US" sz="1200" dirty="0">
+                <a:latin typeface="+mj-lt"/>
+              </a:rPr>
+              <a:t>可以處理的先處理好</a:t>
+            </a:r>
+            <a:r>
+              <a:rPr lang="en-US" altLang="zh-TW" sz="1200" dirty="0">
+                <a:latin typeface="+mj-lt"/>
+              </a:rPr>
+              <a:t>(</a:t>
+            </a:r>
+            <a:r>
+              <a:rPr lang="zh-TW" altLang="en-US" sz="1200" dirty="0">
+                <a:latin typeface="+mj-lt"/>
+              </a:rPr>
+              <a:t>因為速度比較快</a:t>
+            </a:r>
+            <a:r>
+              <a:rPr lang="en-US" altLang="zh-TW" sz="1200" dirty="0">
+                <a:latin typeface="+mj-lt"/>
+              </a:rPr>
+              <a:t>)</a:t>
+            </a:r>
+            <a:r>
+              <a:rPr lang="zh-TW" altLang="en-US" sz="1200" dirty="0">
+                <a:latin typeface="+mj-lt"/>
+              </a:rPr>
+              <a:t>，接著那些</a:t>
+            </a:r>
+            <a:r>
+              <a:rPr lang="en-US" altLang="zh-TW" sz="1200" dirty="0">
+                <a:latin typeface="+mj-lt"/>
+              </a:rPr>
+              <a:t>inner part</a:t>
+            </a:r>
+            <a:r>
+              <a:rPr lang="zh-TW" altLang="en-US" sz="1200" dirty="0">
+                <a:latin typeface="+mj-lt"/>
+              </a:rPr>
+              <a:t>再用</a:t>
+            </a:r>
+            <a:r>
+              <a:rPr lang="en-US" altLang="zh-TW" sz="1200" dirty="0" err="1">
+                <a:latin typeface="+mj-lt"/>
+              </a:rPr>
+              <a:t>StWL</a:t>
+            </a:r>
+            <a:r>
+              <a:rPr lang="zh-TW" altLang="en-US" sz="1200" dirty="0">
+                <a:latin typeface="+mj-lt"/>
+              </a:rPr>
+              <a:t>來處理，得到完整的</a:t>
+            </a:r>
+            <a:r>
+              <a:rPr lang="en-US" altLang="zh-TW" sz="1200" dirty="0">
+                <a:latin typeface="+mj-lt"/>
+              </a:rPr>
+              <a:t>gradient</a:t>
+            </a:r>
+            <a:r>
+              <a:rPr lang="zh-TW" altLang="en-US" sz="1200" dirty="0">
+                <a:latin typeface="+mj-lt"/>
+              </a:rPr>
+              <a:t>來得到更精準的</a:t>
+            </a:r>
+            <a:r>
+              <a:rPr lang="en-US" altLang="zh-TW" sz="1200" dirty="0">
+                <a:latin typeface="+mj-lt"/>
+              </a:rPr>
+              <a:t>wirelength.</a:t>
+            </a:r>
+          </a:p>
+        </p:txBody>
+      </p:sp>
+      <p:sp>
+        <p:nvSpPr>
+          <p:cNvPr id="4" name="投影片編號版面配置區 3">
+            <a:extLst>
+              <a:ext uri="{FF2B5EF4-FFF2-40B4-BE49-F238E27FC236}">
+                <a16:creationId xmlns:a16="http://schemas.microsoft.com/office/drawing/2014/main" id="{2C9877FF-D18C-61FB-839D-8B10955E90C8}"/>
+              </a:ext>
+            </a:extLst>
+          </p:cNvPr>
+          <p:cNvSpPr>
+            <a:spLocks noGrp="1"/>
+          </p:cNvSpPr>
+          <p:nvPr>
+            <p:ph type="sldNum" sz="quarter" idx="5"/>
+          </p:nvPr>
+        </p:nvSpPr>
+        <p:spPr/>
+        <p:txBody>
+          <a:bodyPr/>
+          <a:lstStyle/>
+          <a:p>
+            <a:fld id="{9D457EAB-1485-47AD-BEAD-484FAEBF5A54}" type="slidenum">
+              <a:rPr lang="en-US" smtClean="0"/>
+              <a:t>9</a:t>
+            </a:fld>
+            <a:endParaRPr lang="en-US"/>
+          </a:p>
+        </p:txBody>
+      </p:sp>
+    </p:spTree>
+    <p:extLst>
+      <p:ext uri="{BB962C8B-B14F-4D97-AF65-F5344CB8AC3E}">
+        <p14:creationId xmlns:p14="http://schemas.microsoft.com/office/powerpoint/2010/main" val="4045972828"/>
+      </p:ext>
+    </p:extLst>
+  </p:cSld>
+  <p:clrMapOvr>
+    <a:masterClrMapping/>
+  </p:clrMapOvr>
+</p:notes>
+</file>
+
+<file path=ppt/notesSlides/notesSlide8.xml><?xml version="1.0" encoding="utf-8"?>
+<p:notes xmlns:a="http://schemas.openxmlformats.org/drawingml/2006/main" xmlns:r="http://schemas.openxmlformats.org/officeDocument/2006/relationships" xmlns:p="http://schemas.openxmlformats.org/presentationml/2006/main">
+  <p:cSld>
+    <p:spTree>
+      <p:nvGrpSpPr>
+        <p:cNvPr id="1" name="">
+          <a:extLst>
+            <a:ext uri="{FF2B5EF4-FFF2-40B4-BE49-F238E27FC236}">
+              <a16:creationId xmlns:a16="http://schemas.microsoft.com/office/drawing/2014/main" id="{675D64E4-9CB7-2840-5301-7BDBB4FD71EB}"/>
+            </a:ext>
+          </a:extLst>
+        </p:cNvPr>
+        <p:cNvGrpSpPr/>
+        <p:nvPr/>
+      </p:nvGrpSpPr>
+      <p:grpSpPr>
+        <a:xfrm>
+          <a:off x="0" y="0"/>
+          <a:ext cx="0" cy="0"/>
+          <a:chOff x="0" y="0"/>
+          <a:chExt cx="0" cy="0"/>
+        </a:xfrm>
+      </p:grpSpPr>
+      <p:sp>
+        <p:nvSpPr>
+          <p:cNvPr id="2" name="投影片影像版面配置區 1">
+            <a:extLst>
+              <a:ext uri="{FF2B5EF4-FFF2-40B4-BE49-F238E27FC236}">
+                <a16:creationId xmlns:a16="http://schemas.microsoft.com/office/drawing/2014/main" id="{788CC2E5-083B-CC6D-D298-24DB2E9248C4}"/>
+              </a:ext>
+            </a:extLst>
+          </p:cNvPr>
+          <p:cNvSpPr>
+            <a:spLocks noGrp="1" noRot="1" noChangeAspect="1"/>
+          </p:cNvSpPr>
+          <p:nvPr>
+            <p:ph type="sldImg"/>
+          </p:nvPr>
+        </p:nvSpPr>
+        <p:spPr/>
+      </p:sp>
+      <p:sp>
+        <p:nvSpPr>
+          <p:cNvPr id="3" name="備忘稿版面配置區 2">
+            <a:extLst>
+              <a:ext uri="{FF2B5EF4-FFF2-40B4-BE49-F238E27FC236}">
+                <a16:creationId xmlns:a16="http://schemas.microsoft.com/office/drawing/2014/main" id="{F191780E-51D3-8E71-5165-A60B8F0C9D9C}"/>
+              </a:ext>
+            </a:extLst>
+          </p:cNvPr>
+          <p:cNvSpPr>
+            <a:spLocks noGrp="1"/>
+          </p:cNvSpPr>
+          <p:nvPr>
+            <p:ph type="body" idx="1"/>
+          </p:nvPr>
+        </p:nvSpPr>
+        <p:spPr/>
+        <p:txBody>
+          <a:bodyPr/>
+          <a:lstStyle/>
+          <a:p>
+            <a:pPr marL="285750" indent="-285750" algn="l">
+              <a:buFont typeface="Arial" panose="020B0604020202020204" pitchFamily="34" charset="0"/>
+              <a:buChar char="•"/>
+            </a:pPr>
+            <a:endParaRPr lang="zh-TW" altLang="en-US" dirty="0"/>
+          </a:p>
+        </p:txBody>
+      </p:sp>
+      <p:sp>
+        <p:nvSpPr>
+          <p:cNvPr id="4" name="投影片編號版面配置區 3">
+            <a:extLst>
+              <a:ext uri="{FF2B5EF4-FFF2-40B4-BE49-F238E27FC236}">
+                <a16:creationId xmlns:a16="http://schemas.microsoft.com/office/drawing/2014/main" id="{21FCD2A9-EC9C-7CC5-DC45-FC6A34B8771F}"/>
+              </a:ext>
+            </a:extLst>
+          </p:cNvPr>
+          <p:cNvSpPr>
+            <a:spLocks noGrp="1"/>
+          </p:cNvSpPr>
+          <p:nvPr>
+            <p:ph type="sldNum" sz="quarter" idx="5"/>
+          </p:nvPr>
+        </p:nvSpPr>
+        <p:spPr/>
+        <p:txBody>
+          <a:bodyPr/>
+          <a:lstStyle/>
+          <a:p>
+            <a:fld id="{9D457EAB-1485-47AD-BEAD-484FAEBF5A54}" type="slidenum">
+              <a:rPr lang="en-US" smtClean="0"/>
+              <a:t>10</a:t>
+            </a:fld>
+            <a:endParaRPr lang="en-US"/>
+          </a:p>
+        </p:txBody>
+      </p:sp>
+    </p:spTree>
+    <p:extLst>
+      <p:ext uri="{BB962C8B-B14F-4D97-AF65-F5344CB8AC3E}">
+        <p14:creationId xmlns:p14="http://schemas.microsoft.com/office/powerpoint/2010/main" val="3174835727"/>
+      </p:ext>
+    </p:extLst>
+  </p:cSld>
+  <p:clrMapOvr>
+    <a:masterClrMapping/>
+  </p:clrMapOvr>
+</p:notes>
+</file>
+
+<file path=ppt/notesSlides/notesSlide9.xml><?xml version="1.0" encoding="utf-8"?>
+<p:notes xmlns:a="http://schemas.openxmlformats.org/drawingml/2006/main" xmlns:r="http://schemas.openxmlformats.org/officeDocument/2006/relationships" xmlns:p="http://schemas.openxmlformats.org/presentationml/2006/main">
+  <p:cSld>
+    <p:spTree>
+      <p:nvGrpSpPr>
+        <p:cNvPr id="1" name="">
+          <a:extLst>
+            <a:ext uri="{FF2B5EF4-FFF2-40B4-BE49-F238E27FC236}">
+              <a16:creationId xmlns:a16="http://schemas.microsoft.com/office/drawing/2014/main" id="{6BAD882C-C5B8-00AF-82D7-1171AF273AE1}"/>
+            </a:ext>
+          </a:extLst>
+        </p:cNvPr>
+        <p:cNvGrpSpPr/>
+        <p:nvPr/>
+      </p:nvGrpSpPr>
+      <p:grpSpPr>
+        <a:xfrm>
+          <a:off x="0" y="0"/>
+          <a:ext cx="0" cy="0"/>
+          <a:chOff x="0" y="0"/>
+          <a:chExt cx="0" cy="0"/>
+        </a:xfrm>
+      </p:grpSpPr>
+      <p:sp>
+        <p:nvSpPr>
+          <p:cNvPr id="2" name="投影片影像版面配置區 1">
+            <a:extLst>
+              <a:ext uri="{FF2B5EF4-FFF2-40B4-BE49-F238E27FC236}">
+                <a16:creationId xmlns:a16="http://schemas.microsoft.com/office/drawing/2014/main" id="{92A0FC44-0AA6-979C-98F3-6A2362C6E341}"/>
+              </a:ext>
+            </a:extLst>
+          </p:cNvPr>
+          <p:cNvSpPr>
+            <a:spLocks noGrp="1" noRot="1" noChangeAspect="1"/>
+          </p:cNvSpPr>
+          <p:nvPr>
+            <p:ph type="sldImg"/>
+          </p:nvPr>
+        </p:nvSpPr>
+        <p:spPr/>
+      </p:sp>
+      <p:sp>
+        <p:nvSpPr>
+          <p:cNvPr id="3" name="備忘稿版面配置區 2">
+            <a:extLst>
+              <a:ext uri="{FF2B5EF4-FFF2-40B4-BE49-F238E27FC236}">
+                <a16:creationId xmlns:a16="http://schemas.microsoft.com/office/drawing/2014/main" id="{766DB162-10F8-B0A5-FD69-52489E2E3BB1}"/>
+              </a:ext>
+            </a:extLst>
+          </p:cNvPr>
+          <p:cNvSpPr>
+            <a:spLocks noGrp="1"/>
+          </p:cNvSpPr>
+          <p:nvPr>
+            <p:ph type="body" idx="1"/>
+          </p:nvPr>
+        </p:nvSpPr>
+        <p:spPr/>
+        <p:txBody>
+          <a:bodyPr/>
+          <a:lstStyle/>
+          <a:p>
+            <a:pPr marL="285750" indent="-285750" algn="l">
+              <a:buFont typeface="Arial" panose="020B0604020202020204" pitchFamily="34" charset="0"/>
+              <a:buChar char="•"/>
+            </a:pPr>
+            <a:endParaRPr lang="zh-TW" altLang="en-US" dirty="0"/>
+          </a:p>
+        </p:txBody>
+      </p:sp>
+      <p:sp>
+        <p:nvSpPr>
+          <p:cNvPr id="4" name="投影片編號版面配置區 3">
+            <a:extLst>
+              <a:ext uri="{FF2B5EF4-FFF2-40B4-BE49-F238E27FC236}">
+                <a16:creationId xmlns:a16="http://schemas.microsoft.com/office/drawing/2014/main" id="{01A1B939-2855-2AA3-45A5-6DF9E5483376}"/>
+              </a:ext>
+            </a:extLst>
+          </p:cNvPr>
+          <p:cNvSpPr>
+            <a:spLocks noGrp="1"/>
+          </p:cNvSpPr>
+          <p:nvPr>
+            <p:ph type="sldNum" sz="quarter" idx="5"/>
+          </p:nvPr>
+        </p:nvSpPr>
+        <p:spPr/>
+        <p:txBody>
+          <a:bodyPr/>
+          <a:lstStyle/>
+          <a:p>
+            <a:fld id="{9D457EAB-1485-47AD-BEAD-484FAEBF5A54}" type="slidenum">
+              <a:rPr lang="en-US" smtClean="0"/>
+              <a:t>11</a:t>
+            </a:fld>
+            <a:endParaRPr lang="en-US"/>
+          </a:p>
+        </p:txBody>
+      </p:sp>
+    </p:spTree>
+    <p:extLst>
+      <p:ext uri="{BB962C8B-B14F-4D97-AF65-F5344CB8AC3E}">
+        <p14:creationId xmlns:p14="http://schemas.microsoft.com/office/powerpoint/2010/main" val="1956012132"/>
       </p:ext>
     </p:extLst>
   </p:cSld>
@@ -2366,7 +3151,7 @@
           <a:p>
             <a:fld id="{99BA7BAB-F69F-4C21-8D40-7AA273A2D01F}" type="datetime1">
               <a:rPr lang="en-US" smtClean="0"/>
-              <a:t>3/8/2024</a:t>
+              <a:t>3/11/2024</a:t>
             </a:fld>
             <a:endParaRPr lang="en-US"/>
           </a:p>
@@ -2571,7 +3356,7 @@
           <a:p>
             <a:fld id="{FB00A8EC-4678-43EE-BE64-F312B7F1A46F}" type="datetime1">
               <a:rPr lang="en-US" smtClean="0"/>
-              <a:t>3/8/2024</a:t>
+              <a:t>3/11/2024</a:t>
             </a:fld>
             <a:endParaRPr lang="en-US"/>
           </a:p>
@@ -2779,7 +3564,7 @@
           <a:p>
             <a:fld id="{9487F23D-EA8F-4C56-9373-23F6109AD11F}" type="datetime1">
               <a:rPr lang="en-US" smtClean="0"/>
-              <a:t>3/8/2024</a:t>
+              <a:t>3/11/2024</a:t>
             </a:fld>
             <a:endParaRPr lang="en-US"/>
           </a:p>
@@ -2977,7 +3762,7 @@
           <a:p>
             <a:fld id="{A34E716E-0239-4A81-9CF4-D3B9651721CF}" type="datetime1">
               <a:rPr lang="en-US" smtClean="0"/>
-              <a:t>3/8/2024</a:t>
+              <a:t>3/11/2024</a:t>
             </a:fld>
             <a:endParaRPr lang="en-US"/>
           </a:p>
@@ -3259,7 +4044,7 @@
           <a:p>
             <a:fld id="{CC112E56-3D97-4B86-935C-1C493DD86A08}" type="datetime1">
               <a:rPr lang="en-US" smtClean="0"/>
-              <a:t>3/8/2024</a:t>
+              <a:t>3/11/2024</a:t>
             </a:fld>
             <a:endParaRPr lang="en-US"/>
           </a:p>
@@ -3524,7 +4309,7 @@
           <a:p>
             <a:fld id="{40649135-BABF-4F63-9AF8-3CEC545E47DC}" type="datetime1">
               <a:rPr lang="en-US" smtClean="0"/>
-              <a:t>3/8/2024</a:t>
+              <a:t>3/11/2024</a:t>
             </a:fld>
             <a:endParaRPr lang="en-US"/>
           </a:p>
@@ -3936,7 +4721,7 @@
           <a:p>
             <a:fld id="{B16EBC02-C9C0-442D-A8A6-494057203542}" type="datetime1">
               <a:rPr lang="en-US" smtClean="0"/>
-              <a:t>3/8/2024</a:t>
+              <a:t>3/11/2024</a:t>
             </a:fld>
             <a:endParaRPr lang="en-US"/>
           </a:p>
@@ -4077,7 +4862,7 @@
           <a:p>
             <a:fld id="{A126C4B4-559D-414E-BC9C-16A745BBF3C3}" type="datetime1">
               <a:rPr lang="en-US" smtClean="0"/>
-              <a:t>3/8/2024</a:t>
+              <a:t>3/11/2024</a:t>
             </a:fld>
             <a:endParaRPr lang="en-US"/>
           </a:p>
@@ -4190,7 +4975,7 @@
           <a:p>
             <a:fld id="{0D49D49E-73A5-4C03-BFEA-3D845EB044D8}" type="datetime1">
               <a:rPr lang="en-US" smtClean="0"/>
-              <a:t>3/8/2024</a:t>
+              <a:t>3/11/2024</a:t>
             </a:fld>
             <a:endParaRPr lang="en-US"/>
           </a:p>
@@ -4501,7 +5286,7 @@
           <a:p>
             <a:fld id="{4A0F93E6-3134-410C-B573-A5F6B38FC346}" type="datetime1">
               <a:rPr lang="en-US" smtClean="0"/>
-              <a:t>3/8/2024</a:t>
+              <a:t>3/11/2024</a:t>
             </a:fld>
             <a:endParaRPr lang="en-US"/>
           </a:p>
@@ -4789,7 +5574,7 @@
           <a:p>
             <a:fld id="{F766E70F-5320-45A5-BE33-1819A93C2AF4}" type="datetime1">
               <a:rPr lang="en-US" smtClean="0"/>
-              <a:t>3/8/2024</a:t>
+              <a:t>3/11/2024</a:t>
             </a:fld>
             <a:endParaRPr lang="en-US"/>
           </a:p>
@@ -5030,7 +5815,7 @@
           <a:p>
             <a:fld id="{A706458B-0289-40FF-A02D-2C541B7F1CB6}" type="datetime1">
               <a:rPr lang="en-US" smtClean="0"/>
-              <a:t>3/8/2024</a:t>
+              <a:t>3/11/2024</a:t>
             </a:fld>
             <a:endParaRPr lang="en-US"/>
           </a:p>
@@ -5832,6 +6617,1304 @@
 </p:sld>
 </file>
 
+<file path=ppt/slides/slide10.xml><?xml version="1.0" encoding="utf-8"?>
+<p:sld xmlns:a="http://schemas.openxmlformats.org/drawingml/2006/main" xmlns:r="http://schemas.openxmlformats.org/officeDocument/2006/relationships" xmlns:p="http://schemas.openxmlformats.org/presentationml/2006/main">
+  <p:cSld>
+    <p:spTree>
+      <p:nvGrpSpPr>
+        <p:cNvPr id="1" name="">
+          <a:extLst>
+            <a:ext uri="{FF2B5EF4-FFF2-40B4-BE49-F238E27FC236}">
+              <a16:creationId xmlns:a16="http://schemas.microsoft.com/office/drawing/2014/main" id="{A697730E-8EF6-3EB8-210B-5D9D76198354}"/>
+            </a:ext>
+          </a:extLst>
+        </p:cNvPr>
+        <p:cNvGrpSpPr/>
+        <p:nvPr/>
+      </p:nvGrpSpPr>
+      <p:grpSpPr>
+        <a:xfrm>
+          <a:off x="0" y="0"/>
+          <a:ext cx="0" cy="0"/>
+          <a:chOff x="0" y="0"/>
+          <a:chExt cx="0" cy="0"/>
+        </a:xfrm>
+      </p:grpSpPr>
+      <p:sp>
+        <p:nvSpPr>
+          <p:cNvPr id="2" name="標題 1">
+            <a:extLst>
+              <a:ext uri="{FF2B5EF4-FFF2-40B4-BE49-F238E27FC236}">
+                <a16:creationId xmlns:a16="http://schemas.microsoft.com/office/drawing/2014/main" id="{71C568AC-EEE4-A0F9-5F7D-EC8717D59625}"/>
+              </a:ext>
+            </a:extLst>
+          </p:cNvPr>
+          <p:cNvSpPr>
+            <a:spLocks noGrp="1"/>
+          </p:cNvSpPr>
+          <p:nvPr>
+            <p:ph type="title"/>
+          </p:nvPr>
+        </p:nvSpPr>
+        <p:spPr/>
+        <p:txBody>
+          <a:bodyPr/>
+          <a:lstStyle/>
+          <a:p>
+            <a:r>
+              <a:rPr lang="en-US" altLang="zh-TW" dirty="0"/>
+              <a:t>Proposed Algorithm - </a:t>
+            </a:r>
+            <a:r>
+              <a:rPr lang="en-US" altLang="zh-TW" sz="3200" dirty="0" err="1"/>
+              <a:t>StWL</a:t>
+            </a:r>
+            <a:r>
+              <a:rPr lang="en-US" altLang="zh-TW" sz="3200" dirty="0"/>
+              <a:t> Optimization in GP</a:t>
+            </a:r>
+            <a:endParaRPr lang="zh-TW" altLang="en-US" dirty="0"/>
+          </a:p>
+        </p:txBody>
+      </p:sp>
+      <p:sp>
+        <p:nvSpPr>
+          <p:cNvPr id="3" name="內容版面配置區 2">
+            <a:extLst>
+              <a:ext uri="{FF2B5EF4-FFF2-40B4-BE49-F238E27FC236}">
+                <a16:creationId xmlns:a16="http://schemas.microsoft.com/office/drawing/2014/main" id="{780C4160-7FA6-5F85-4A4E-DFAAF973AB7E}"/>
+              </a:ext>
+            </a:extLst>
+          </p:cNvPr>
+          <p:cNvSpPr>
+            <a:spLocks noGrp="1"/>
+          </p:cNvSpPr>
+          <p:nvPr>
+            <p:ph idx="1"/>
+          </p:nvPr>
+        </p:nvSpPr>
+        <p:spPr/>
+        <p:txBody>
+          <a:bodyPr>
+            <a:normAutofit/>
+          </a:bodyPr>
+          <a:lstStyle/>
+          <a:p>
+            <a:pPr marL="0" indent="0">
+              <a:buNone/>
+            </a:pPr>
+            <a:r>
+              <a:rPr lang="en-US" altLang="zh-TW" sz="2200" b="1" dirty="0"/>
+              <a:t>(2)</a:t>
+            </a:r>
+            <a:r>
+              <a:rPr lang="zh-TW" altLang="en-US" sz="2200" b="1" dirty="0"/>
+              <a:t>  </a:t>
+            </a:r>
+            <a:r>
+              <a:rPr lang="en-US" altLang="zh-TW" sz="2200" b="1" dirty="0"/>
+              <a:t>RSMT segments division</a:t>
+            </a:r>
+          </a:p>
+          <a:p>
+            <a:pPr marL="0" indent="0">
+              <a:buNone/>
+            </a:pPr>
+            <a:endParaRPr lang="en-US" altLang="zh-TW" sz="400" b="1" dirty="0"/>
+          </a:p>
+          <a:p>
+            <a:pPr lvl="1">
+              <a:lnSpc>
+                <a:spcPct val="150000"/>
+              </a:lnSpc>
+            </a:pPr>
+            <a:r>
+              <a:rPr lang="en-US" altLang="zh-TW" sz="2000" dirty="0">
+                <a:latin typeface="+mj-lt"/>
+              </a:rPr>
+              <a:t>It</a:t>
+            </a:r>
+            <a:r>
+              <a:rPr lang="zh-TW" altLang="en-US" sz="2000" dirty="0">
+                <a:latin typeface="+mj-lt"/>
+              </a:rPr>
+              <a:t> </a:t>
+            </a:r>
+            <a:r>
+              <a:rPr lang="en-US" altLang="zh-TW" sz="2000" dirty="0">
+                <a:latin typeface="+mj-lt"/>
+              </a:rPr>
+              <a:t>is time-consuming and unnecessary to optimize all parts by a</a:t>
+            </a:r>
+            <a:r>
+              <a:rPr lang="zh-TW" altLang="en-US" sz="2000" dirty="0">
+                <a:latin typeface="+mj-lt"/>
+              </a:rPr>
+              <a:t> </a:t>
+            </a:r>
+            <a:r>
+              <a:rPr lang="en-US" altLang="zh-TW" sz="2000" dirty="0">
+                <a:latin typeface="+mj-lt"/>
+              </a:rPr>
+              <a:t>single </a:t>
+            </a:r>
+            <a:r>
+              <a:rPr lang="en-US" altLang="zh-TW" sz="2000" dirty="0" err="1">
+                <a:latin typeface="+mj-lt"/>
+              </a:rPr>
+              <a:t>StWL</a:t>
+            </a:r>
+            <a:r>
+              <a:rPr lang="en-US" altLang="zh-TW" sz="2000" dirty="0">
+                <a:latin typeface="+mj-lt"/>
+              </a:rPr>
+              <a:t> model.</a:t>
+            </a:r>
+          </a:p>
+          <a:p>
+            <a:pPr lvl="1">
+              <a:lnSpc>
+                <a:spcPct val="150000"/>
+              </a:lnSpc>
+            </a:pPr>
+            <a:endParaRPr lang="en-US" altLang="zh-TW" sz="400" dirty="0">
+              <a:latin typeface="+mj-lt"/>
+            </a:endParaRPr>
+          </a:p>
+          <a:p>
+            <a:pPr lvl="1">
+              <a:lnSpc>
+                <a:spcPct val="150000"/>
+              </a:lnSpc>
+            </a:pPr>
+            <a:r>
+              <a:rPr lang="en-US" altLang="zh-TW" sz="2000" i="1" u="sng" dirty="0">
+                <a:latin typeface="+mj-lt"/>
+              </a:rPr>
+              <a:t>Assumption</a:t>
+            </a:r>
+            <a:r>
+              <a:rPr lang="en-US" altLang="zh-TW" sz="2000" dirty="0">
+                <a:latin typeface="+mj-lt"/>
+              </a:rPr>
+              <a:t>: The Steiner points in the topology can be considered </a:t>
+            </a:r>
+            <a:r>
+              <a:rPr lang="en-US" altLang="zh-TW" sz="2000" b="1" i="1" dirty="0">
+                <a:latin typeface="+mj-lt"/>
+              </a:rPr>
+              <a:t>fixed</a:t>
+            </a:r>
+            <a:r>
+              <a:rPr lang="en-US" altLang="zh-TW" sz="2000" dirty="0">
+                <a:latin typeface="+mj-lt"/>
+              </a:rPr>
+              <a:t> in each iteration.</a:t>
+            </a:r>
+          </a:p>
+          <a:p>
+            <a:pPr lvl="2">
+              <a:lnSpc>
+                <a:spcPct val="150000"/>
+              </a:lnSpc>
+            </a:pPr>
+            <a:r>
+              <a:rPr lang="en-US" altLang="zh-TW" sz="1600" dirty="0">
+                <a:latin typeface="+mj-lt"/>
+              </a:rPr>
+              <a:t>Splits the net into a fixed trunk part and a changeable branch part.</a:t>
+            </a:r>
+          </a:p>
+          <a:p>
+            <a:pPr lvl="2">
+              <a:lnSpc>
+                <a:spcPct val="150000"/>
+              </a:lnSpc>
+            </a:pPr>
+            <a:r>
+              <a:rPr lang="en-US" altLang="zh-TW" sz="1600" dirty="0">
+                <a:latin typeface="+mj-lt"/>
+              </a:rPr>
+              <a:t>Typically, this assumption is satisfied for most iterations in the GP stage.</a:t>
+            </a:r>
+          </a:p>
+          <a:p>
+            <a:pPr lvl="2">
+              <a:lnSpc>
+                <a:spcPct val="150000"/>
+              </a:lnSpc>
+            </a:pPr>
+            <a:endParaRPr lang="en-US" altLang="zh-TW" sz="400" dirty="0">
+              <a:latin typeface="+mj-lt"/>
+            </a:endParaRPr>
+          </a:p>
+          <a:p>
+            <a:pPr lvl="1">
+              <a:lnSpc>
+                <a:spcPct val="150000"/>
+              </a:lnSpc>
+            </a:pPr>
+            <a:r>
+              <a:rPr lang="en-US" altLang="zh-TW" sz="2000" dirty="0">
+                <a:latin typeface="+mj-lt"/>
+              </a:rPr>
+              <a:t>Hybrid wirelength model:</a:t>
+            </a:r>
+          </a:p>
+          <a:p>
+            <a:pPr lvl="2">
+              <a:lnSpc>
+                <a:spcPct val="150000"/>
+              </a:lnSpc>
+            </a:pPr>
+            <a:r>
+              <a:rPr lang="en-US" altLang="zh-TW" sz="1600" dirty="0">
+                <a:latin typeface="+mj-lt"/>
+              </a:rPr>
+              <a:t> </a:t>
+            </a:r>
+          </a:p>
+          <a:p>
+            <a:pPr lvl="2">
+              <a:lnSpc>
+                <a:spcPct val="150000"/>
+              </a:lnSpc>
+            </a:pPr>
+            <a:endParaRPr lang="en-US" altLang="zh-TW" sz="1600" dirty="0">
+              <a:latin typeface="+mj-lt"/>
+            </a:endParaRPr>
+          </a:p>
+        </p:txBody>
+      </p:sp>
+      <p:sp>
+        <p:nvSpPr>
+          <p:cNvPr id="4" name="投影片編號版面配置區 3">
+            <a:extLst>
+              <a:ext uri="{FF2B5EF4-FFF2-40B4-BE49-F238E27FC236}">
+                <a16:creationId xmlns:a16="http://schemas.microsoft.com/office/drawing/2014/main" id="{84C84211-0109-220E-5083-3B5BFBBE2378}"/>
+              </a:ext>
+            </a:extLst>
+          </p:cNvPr>
+          <p:cNvSpPr>
+            <a:spLocks noGrp="1"/>
+          </p:cNvSpPr>
+          <p:nvPr>
+            <p:ph type="sldNum" sz="quarter" idx="12"/>
+          </p:nvPr>
+        </p:nvSpPr>
+        <p:spPr/>
+        <p:txBody>
+          <a:bodyPr/>
+          <a:lstStyle/>
+          <a:p>
+            <a:fld id="{666274A1-CF9C-426A-8DD4-B13ED0C24231}" type="slidenum">
+              <a:rPr lang="en-US" smtClean="0"/>
+              <a:t>9</a:t>
+            </a:fld>
+            <a:endParaRPr lang="en-US"/>
+          </a:p>
+        </p:txBody>
+      </p:sp>
+      <p:grpSp>
+        <p:nvGrpSpPr>
+          <p:cNvPr id="12" name="群組 11">
+            <a:extLst>
+              <a:ext uri="{FF2B5EF4-FFF2-40B4-BE49-F238E27FC236}">
+                <a16:creationId xmlns:a16="http://schemas.microsoft.com/office/drawing/2014/main" id="{700BBF54-A890-E257-0E50-13F81324313C}"/>
+              </a:ext>
+            </a:extLst>
+          </p:cNvPr>
+          <p:cNvGrpSpPr/>
+          <p:nvPr/>
+        </p:nvGrpSpPr>
+        <p:grpSpPr>
+          <a:xfrm>
+            <a:off x="7076499" y="4367213"/>
+            <a:ext cx="4597341" cy="2354262"/>
+            <a:chOff x="5308659" y="2993818"/>
+            <a:chExt cx="6233310" cy="3324225"/>
+          </a:xfrm>
+        </p:grpSpPr>
+        <p:pic>
+          <p:nvPicPr>
+            <p:cNvPr id="13" name="圖片 12">
+              <a:extLst>
+                <a:ext uri="{FF2B5EF4-FFF2-40B4-BE49-F238E27FC236}">
+                  <a16:creationId xmlns:a16="http://schemas.microsoft.com/office/drawing/2014/main" id="{3803A9C9-0565-6CD2-D7C9-BF6A2E2C17F7}"/>
+                </a:ext>
+              </a:extLst>
+            </p:cNvPr>
+            <p:cNvPicPr>
+              <a:picLocks noChangeAspect="1"/>
+            </p:cNvPicPr>
+            <p:nvPr/>
+          </p:nvPicPr>
+          <p:blipFill rotWithShape="1">
+            <a:blip r:embed="rId3"/>
+            <a:srcRect t="1431"/>
+            <a:stretch/>
+          </p:blipFill>
+          <p:spPr>
+            <a:xfrm>
+              <a:off x="5308659" y="2993818"/>
+              <a:ext cx="6233310" cy="3324225"/>
+            </a:xfrm>
+            <a:prstGeom prst="rect">
+              <a:avLst/>
+            </a:prstGeom>
+          </p:spPr>
+        </p:pic>
+        <p:sp>
+          <p:nvSpPr>
+            <p:cNvPr id="14" name="文字方塊 13">
+              <a:extLst>
+                <a:ext uri="{FF2B5EF4-FFF2-40B4-BE49-F238E27FC236}">
+                  <a16:creationId xmlns:a16="http://schemas.microsoft.com/office/drawing/2014/main" id="{4286CD4B-4967-A685-9C7E-DD258A95769A}"/>
+                </a:ext>
+              </a:extLst>
+            </p:cNvPr>
+            <p:cNvSpPr txBox="1"/>
+            <p:nvPr/>
+          </p:nvSpPr>
+          <p:spPr>
+            <a:xfrm>
+              <a:off x="6343048" y="3955983"/>
+              <a:ext cx="671979" cy="369332"/>
+            </a:xfrm>
+            <a:prstGeom prst="rect">
+              <a:avLst/>
+            </a:prstGeom>
+            <a:noFill/>
+          </p:spPr>
+          <p:txBody>
+            <a:bodyPr wrap="none" rtlCol="0">
+              <a:spAutoFit/>
+            </a:bodyPr>
+            <a:lstStyle/>
+            <a:p>
+              <a:r>
+                <a:rPr lang="en-US" altLang="zh-TW" dirty="0"/>
+                <a:t>trunk</a:t>
+              </a:r>
+              <a:endParaRPr lang="zh-TW" altLang="en-US" dirty="0"/>
+            </a:p>
+          </p:txBody>
+        </p:sp>
+        <p:sp>
+          <p:nvSpPr>
+            <p:cNvPr id="15" name="文字方塊 14">
+              <a:extLst>
+                <a:ext uri="{FF2B5EF4-FFF2-40B4-BE49-F238E27FC236}">
+                  <a16:creationId xmlns:a16="http://schemas.microsoft.com/office/drawing/2014/main" id="{31DD4D2A-44AD-2BAF-ADE8-9382FF2BEFD2}"/>
+                </a:ext>
+              </a:extLst>
+            </p:cNvPr>
+            <p:cNvSpPr txBox="1"/>
+            <p:nvPr/>
+          </p:nvSpPr>
+          <p:spPr>
+            <a:xfrm>
+              <a:off x="6437697" y="4868668"/>
+              <a:ext cx="813043" cy="369332"/>
+            </a:xfrm>
+            <a:prstGeom prst="rect">
+              <a:avLst/>
+            </a:prstGeom>
+            <a:noFill/>
+          </p:spPr>
+          <p:txBody>
+            <a:bodyPr wrap="none" rtlCol="0">
+              <a:spAutoFit/>
+            </a:bodyPr>
+            <a:lstStyle/>
+            <a:p>
+              <a:r>
+                <a:rPr lang="en-US" altLang="zh-TW" dirty="0">
+                  <a:solidFill>
+                    <a:srgbClr val="00B0F0"/>
+                  </a:solidFill>
+                </a:rPr>
+                <a:t>branch</a:t>
+              </a:r>
+              <a:endParaRPr lang="zh-TW" altLang="en-US" dirty="0">
+                <a:solidFill>
+                  <a:srgbClr val="00B0F0"/>
+                </a:solidFill>
+              </a:endParaRPr>
+            </a:p>
+          </p:txBody>
+        </p:sp>
+      </p:grpSp>
+      <p:pic>
+        <p:nvPicPr>
+          <p:cNvPr id="17" name="圖片 16">
+            <a:extLst>
+              <a:ext uri="{FF2B5EF4-FFF2-40B4-BE49-F238E27FC236}">
+                <a16:creationId xmlns:a16="http://schemas.microsoft.com/office/drawing/2014/main" id="{81F48AC1-5511-20E1-67C7-A4203E71C129}"/>
+              </a:ext>
+            </a:extLst>
+          </p:cNvPr>
+          <p:cNvPicPr>
+            <a:picLocks noChangeAspect="1"/>
+          </p:cNvPicPr>
+          <p:nvPr/>
+        </p:nvPicPr>
+        <p:blipFill rotWithShape="1">
+          <a:blip r:embed="rId4"/>
+          <a:srcRect l="3308"/>
+          <a:stretch/>
+        </p:blipFill>
+        <p:spPr>
+          <a:xfrm>
+            <a:off x="2042419" y="5143468"/>
+            <a:ext cx="3618338" cy="547890"/>
+          </a:xfrm>
+          <a:prstGeom prst="rect">
+            <a:avLst/>
+          </a:prstGeom>
+        </p:spPr>
+      </p:pic>
+      <mc:AlternateContent xmlns:mc="http://schemas.openxmlformats.org/markup-compatibility/2006">
+        <mc:Choice xmlns:a14="http://schemas.microsoft.com/office/drawing/2010/main" Requires="a14">
+          <p:sp>
+            <p:nvSpPr>
+              <p:cNvPr id="18" name="文字方塊 17">
+                <a:extLst>
+                  <a:ext uri="{FF2B5EF4-FFF2-40B4-BE49-F238E27FC236}">
+                    <a16:creationId xmlns:a16="http://schemas.microsoft.com/office/drawing/2014/main" id="{44842323-7CC1-C786-BFBE-99C8D1042E32}"/>
+                  </a:ext>
+                </a:extLst>
+              </p:cNvPr>
+              <p:cNvSpPr txBox="1"/>
+              <p:nvPr/>
+            </p:nvSpPr>
+            <p:spPr>
+              <a:xfrm>
+                <a:off x="2581744" y="5812124"/>
+                <a:ext cx="2539688" cy="338554"/>
+              </a:xfrm>
+              <a:prstGeom prst="rect">
+                <a:avLst/>
+              </a:prstGeom>
+              <a:noFill/>
+              <a:ln>
+                <a:solidFill>
+                  <a:schemeClr val="tx1"/>
+                </a:solidFill>
+              </a:ln>
+            </p:spPr>
+            <p:txBody>
+              <a:bodyPr wrap="square" rtlCol="0">
+                <a:spAutoFit/>
+              </a:bodyPr>
+              <a:lstStyle/>
+              <a:p>
+                <a14:m>
+                  <m:oMathPara xmlns:m="http://schemas.openxmlformats.org/officeDocument/2006/math">
+                    <m:oMathParaPr>
+                      <m:jc m:val="centerGroup"/>
+                    </m:oMathParaPr>
+                    <m:oMath xmlns:m="http://schemas.openxmlformats.org/officeDocument/2006/math">
+                      <m:sSub>
+                        <m:sSubPr>
+                          <m:ctrlPr>
+                            <a:rPr lang="en-US" altLang="zh-TW" sz="1600" i="1" smtClean="0">
+                              <a:latin typeface="Cambria Math" panose="02040503050406030204" pitchFamily="18" charset="0"/>
+                            </a:rPr>
+                          </m:ctrlPr>
+                        </m:sSubPr>
+                        <m:e>
+                          <m:r>
+                            <a:rPr lang="en-US" altLang="zh-TW" sz="1600" b="0" i="1" smtClean="0">
+                              <a:latin typeface="Cambria Math" panose="02040503050406030204" pitchFamily="18" charset="0"/>
+                            </a:rPr>
+                            <m:t>𝑒</m:t>
+                          </m:r>
+                        </m:e>
+                        <m:sub>
+                          <m:r>
+                            <a:rPr lang="en-US" altLang="zh-TW" sz="1600" b="0" i="1" smtClean="0">
+                              <a:latin typeface="Cambria Math" panose="02040503050406030204" pitchFamily="18" charset="0"/>
+                            </a:rPr>
+                            <m:t>𝑖𝑛</m:t>
+                          </m:r>
+                        </m:sub>
+                      </m:sSub>
+                      <m:r>
+                        <a:rPr lang="en-US" altLang="zh-TW" sz="1600" b="0" i="1" smtClean="0">
+                          <a:latin typeface="Cambria Math" panose="02040503050406030204" pitchFamily="18" charset="0"/>
+                        </a:rPr>
+                        <m:t>:</m:t>
+                      </m:r>
+                      <m:r>
+                        <a:rPr lang="en-US" altLang="zh-TW" sz="1600" b="0" i="1" smtClean="0">
+                          <a:latin typeface="Cambria Math" panose="02040503050406030204" pitchFamily="18" charset="0"/>
+                        </a:rPr>
+                        <m:t>𝑖𝑛𝑡𝑒𝑟𝑎𝑙</m:t>
+                      </m:r>
+                      <m:r>
+                        <a:rPr lang="en-US" altLang="zh-TW" sz="1600" b="0" i="1" smtClean="0">
+                          <a:latin typeface="Cambria Math" panose="02040503050406030204" pitchFamily="18" charset="0"/>
+                        </a:rPr>
+                        <m:t> </m:t>
+                      </m:r>
+                      <m:r>
+                        <a:rPr lang="en-US" altLang="zh-TW" sz="1600" b="0" i="1" smtClean="0">
+                          <a:latin typeface="Cambria Math" panose="02040503050406030204" pitchFamily="18" charset="0"/>
+                        </a:rPr>
+                        <m:t>𝑝𝑎𝑟𝑡</m:t>
+                      </m:r>
+                      <m:r>
+                        <a:rPr lang="en-US" altLang="zh-TW" sz="1600" b="0" i="1" smtClean="0">
+                          <a:latin typeface="Cambria Math" panose="02040503050406030204" pitchFamily="18" charset="0"/>
+                        </a:rPr>
+                        <m:t> </m:t>
+                      </m:r>
+                      <m:r>
+                        <a:rPr lang="en-US" altLang="zh-TW" sz="1600" b="0" i="1" smtClean="0">
+                          <a:latin typeface="Cambria Math" panose="02040503050406030204" pitchFamily="18" charset="0"/>
+                        </a:rPr>
+                        <m:t>𝑜𝑓</m:t>
+                      </m:r>
+                      <m:r>
+                        <a:rPr lang="en-US" altLang="zh-TW" sz="1600" b="0" i="1" smtClean="0">
+                          <a:latin typeface="Cambria Math" panose="02040503050406030204" pitchFamily="18" charset="0"/>
+                        </a:rPr>
+                        <m:t> </m:t>
+                      </m:r>
+                      <m:r>
+                        <a:rPr lang="en-US" altLang="zh-TW" sz="1600" b="0" i="1" smtClean="0">
+                          <a:latin typeface="Cambria Math" panose="02040503050406030204" pitchFamily="18" charset="0"/>
+                        </a:rPr>
+                        <m:t>𝑛𝑒𝑡</m:t>
+                      </m:r>
+                      <m:r>
+                        <a:rPr lang="en-US" altLang="zh-TW" sz="1600" b="0" i="1" smtClean="0">
+                          <a:latin typeface="Cambria Math" panose="02040503050406030204" pitchFamily="18" charset="0"/>
+                        </a:rPr>
+                        <m:t> </m:t>
+                      </m:r>
+                      <m:r>
+                        <a:rPr lang="en-US" altLang="zh-TW" sz="1600" b="0" i="1" smtClean="0">
+                          <a:latin typeface="Cambria Math" panose="02040503050406030204" pitchFamily="18" charset="0"/>
+                        </a:rPr>
+                        <m:t>𝑒</m:t>
+                      </m:r>
+                    </m:oMath>
+                  </m:oMathPara>
+                </a14:m>
+                <a:endParaRPr lang="zh-TW" altLang="en-US" sz="1600" dirty="0"/>
+              </a:p>
+            </p:txBody>
+          </p:sp>
+        </mc:Choice>
+        <mc:Fallback>
+          <p:sp>
+            <p:nvSpPr>
+              <p:cNvPr id="18" name="文字方塊 17">
+                <a:extLst>
+                  <a:ext uri="{FF2B5EF4-FFF2-40B4-BE49-F238E27FC236}">
+                    <a16:creationId xmlns:a16="http://schemas.microsoft.com/office/drawing/2014/main" id="{44842323-7CC1-C786-BFBE-99C8D1042E32}"/>
+                  </a:ext>
+                </a:extLst>
+              </p:cNvPr>
+              <p:cNvSpPr txBox="1">
+                <a:spLocks noRot="1" noChangeAspect="1" noMove="1" noResize="1" noEditPoints="1" noAdjustHandles="1" noChangeArrowheads="1" noChangeShapeType="1" noTextEdit="1"/>
+              </p:cNvSpPr>
+              <p:nvPr/>
+            </p:nvSpPr>
+            <p:spPr>
+              <a:xfrm>
+                <a:off x="2581744" y="5812124"/>
+                <a:ext cx="2539688" cy="338554"/>
+              </a:xfrm>
+              <a:prstGeom prst="rect">
+                <a:avLst/>
+              </a:prstGeom>
+              <a:blipFill>
+                <a:blip r:embed="rId5"/>
+                <a:stretch>
+                  <a:fillRect b="-8621"/>
+                </a:stretch>
+              </a:blipFill>
+              <a:ln>
+                <a:solidFill>
+                  <a:schemeClr val="tx1"/>
+                </a:solidFill>
+              </a:ln>
+            </p:spPr>
+            <p:txBody>
+              <a:bodyPr/>
+              <a:lstStyle/>
+              <a:p>
+                <a:r>
+                  <a:rPr lang="zh-TW" altLang="en-US">
+                    <a:noFill/>
+                  </a:rPr>
+                  <a:t> </a:t>
+                </a:r>
+              </a:p>
+            </p:txBody>
+          </p:sp>
+        </mc:Fallback>
+      </mc:AlternateContent>
+    </p:spTree>
+    <p:extLst>
+      <p:ext uri="{BB962C8B-B14F-4D97-AF65-F5344CB8AC3E}">
+        <p14:creationId xmlns:p14="http://schemas.microsoft.com/office/powerpoint/2010/main" val="3193431637"/>
+      </p:ext>
+    </p:extLst>
+  </p:cSld>
+  <p:clrMapOvr>
+    <a:masterClrMapping/>
+  </p:clrMapOvr>
+</p:sld>
+</file>
+
+<file path=ppt/slides/slide11.xml><?xml version="1.0" encoding="utf-8"?>
+<p:sld xmlns:a="http://schemas.openxmlformats.org/drawingml/2006/main" xmlns:r="http://schemas.openxmlformats.org/officeDocument/2006/relationships" xmlns:p="http://schemas.openxmlformats.org/presentationml/2006/main">
+  <p:cSld>
+    <p:spTree>
+      <p:nvGrpSpPr>
+        <p:cNvPr id="1" name="">
+          <a:extLst>
+            <a:ext uri="{FF2B5EF4-FFF2-40B4-BE49-F238E27FC236}">
+              <a16:creationId xmlns:a16="http://schemas.microsoft.com/office/drawing/2014/main" id="{A68D3828-A5E4-2ADF-D0C9-8437EF8F18BB}"/>
+            </a:ext>
+          </a:extLst>
+        </p:cNvPr>
+        <p:cNvGrpSpPr/>
+        <p:nvPr/>
+      </p:nvGrpSpPr>
+      <p:grpSpPr>
+        <a:xfrm>
+          <a:off x="0" y="0"/>
+          <a:ext cx="0" cy="0"/>
+          <a:chOff x="0" y="0"/>
+          <a:chExt cx="0" cy="0"/>
+        </a:xfrm>
+      </p:grpSpPr>
+      <p:sp>
+        <p:nvSpPr>
+          <p:cNvPr id="2" name="標題 1">
+            <a:extLst>
+              <a:ext uri="{FF2B5EF4-FFF2-40B4-BE49-F238E27FC236}">
+                <a16:creationId xmlns:a16="http://schemas.microsoft.com/office/drawing/2014/main" id="{3877F22C-9ADA-DE6F-16F1-5CE7C10C2579}"/>
+              </a:ext>
+            </a:extLst>
+          </p:cNvPr>
+          <p:cNvSpPr>
+            <a:spLocks noGrp="1"/>
+          </p:cNvSpPr>
+          <p:nvPr>
+            <p:ph type="title"/>
+          </p:nvPr>
+        </p:nvSpPr>
+        <p:spPr/>
+        <p:txBody>
+          <a:bodyPr/>
+          <a:lstStyle/>
+          <a:p>
+            <a:r>
+              <a:rPr lang="en-US" altLang="zh-TW" dirty="0"/>
+              <a:t>Proposed Algorithm - </a:t>
+            </a:r>
+            <a:r>
+              <a:rPr lang="en-US" altLang="zh-TW" sz="3200" dirty="0" err="1"/>
+              <a:t>StWL</a:t>
+            </a:r>
+            <a:r>
+              <a:rPr lang="en-US" altLang="zh-TW" sz="3200" dirty="0"/>
+              <a:t> Optimization in GP</a:t>
+            </a:r>
+            <a:endParaRPr lang="zh-TW" altLang="en-US" dirty="0"/>
+          </a:p>
+        </p:txBody>
+      </p:sp>
+      <p:sp>
+        <p:nvSpPr>
+          <p:cNvPr id="3" name="內容版面配置區 2">
+            <a:extLst>
+              <a:ext uri="{FF2B5EF4-FFF2-40B4-BE49-F238E27FC236}">
+                <a16:creationId xmlns:a16="http://schemas.microsoft.com/office/drawing/2014/main" id="{D5AA7BD3-8D31-9F36-639F-6AE1D2A0BF34}"/>
+              </a:ext>
+            </a:extLst>
+          </p:cNvPr>
+          <p:cNvSpPr>
+            <a:spLocks noGrp="1"/>
+          </p:cNvSpPr>
+          <p:nvPr>
+            <p:ph idx="1"/>
+          </p:nvPr>
+        </p:nvSpPr>
+        <p:spPr/>
+        <p:txBody>
+          <a:bodyPr>
+            <a:normAutofit/>
+          </a:bodyPr>
+          <a:lstStyle/>
+          <a:p>
+            <a:pPr marL="0" indent="0">
+              <a:buNone/>
+            </a:pPr>
+            <a:r>
+              <a:rPr lang="en-US" altLang="zh-TW" sz="2200" b="1" dirty="0"/>
+              <a:t>(2)</a:t>
+            </a:r>
+            <a:r>
+              <a:rPr lang="zh-TW" altLang="en-US" sz="2200" b="1" dirty="0"/>
+              <a:t>  </a:t>
+            </a:r>
+            <a:r>
+              <a:rPr lang="en-US" altLang="zh-TW" sz="2200" b="1" dirty="0"/>
+              <a:t>RSMT segments division</a:t>
+            </a:r>
+          </a:p>
+          <a:p>
+            <a:pPr marL="0" indent="0">
+              <a:buNone/>
+            </a:pPr>
+            <a:endParaRPr lang="en-US" altLang="zh-TW" sz="400" b="1" dirty="0"/>
+          </a:p>
+          <a:p>
+            <a:pPr lvl="1">
+              <a:lnSpc>
+                <a:spcPct val="150000"/>
+              </a:lnSpc>
+            </a:pPr>
+            <a:r>
+              <a:rPr lang="en-US" altLang="zh-TW" sz="2000" dirty="0">
+                <a:latin typeface="+mj-lt"/>
+              </a:rPr>
+              <a:t>The green arrow is the gradient from the WA wirelength model </a:t>
+            </a:r>
+          </a:p>
+          <a:p>
+            <a:pPr lvl="2">
+              <a:lnSpc>
+                <a:spcPct val="150000"/>
+              </a:lnSpc>
+            </a:pPr>
+            <a:r>
+              <a:rPr lang="en-US" altLang="zh-TW" sz="1600" dirty="0">
+                <a:latin typeface="+mj-lt"/>
+              </a:rPr>
+              <a:t>Computational efficiency.</a:t>
+            </a:r>
+          </a:p>
+          <a:p>
+            <a:pPr lvl="2">
+              <a:lnSpc>
+                <a:spcPct val="150000"/>
+              </a:lnSpc>
+            </a:pPr>
+            <a:r>
+              <a:rPr lang="en-US" altLang="zh-TW" sz="1600" dirty="0">
+                <a:latin typeface="+mj-lt"/>
+              </a:rPr>
+              <a:t>Gradient values and directions are pretty close to those provided by </a:t>
+            </a:r>
+            <a:r>
+              <a:rPr lang="en-US" altLang="zh-TW" sz="1600" dirty="0" err="1">
+                <a:latin typeface="+mj-lt"/>
+              </a:rPr>
+              <a:t>StWL</a:t>
+            </a:r>
+            <a:r>
+              <a:rPr lang="en-US" altLang="zh-TW" sz="1600" dirty="0">
+                <a:latin typeface="+mj-lt"/>
+              </a:rPr>
+              <a:t> model.</a:t>
+            </a:r>
+          </a:p>
+          <a:p>
+            <a:pPr lvl="2">
+              <a:lnSpc>
+                <a:spcPct val="150000"/>
+              </a:lnSpc>
+            </a:pPr>
+            <a:endParaRPr lang="en-US" altLang="zh-TW" sz="500" dirty="0">
+              <a:latin typeface="+mj-lt"/>
+            </a:endParaRPr>
+          </a:p>
+          <a:p>
+            <a:pPr lvl="1">
+              <a:lnSpc>
+                <a:spcPct val="150000"/>
+              </a:lnSpc>
+            </a:pPr>
+            <a:r>
+              <a:rPr lang="en-US" altLang="zh-TW" sz="2000" dirty="0">
+                <a:latin typeface="+mj-lt"/>
+              </a:rPr>
+              <a:t>To avoids a large number of routing topology analyses.</a:t>
+            </a:r>
+          </a:p>
+          <a:p>
+            <a:pPr lvl="2">
+              <a:lnSpc>
+                <a:spcPct val="150000"/>
+              </a:lnSpc>
+            </a:pPr>
+            <a:r>
+              <a:rPr lang="en-US" altLang="zh-TW" sz="1600" dirty="0">
+                <a:latin typeface="+mj-lt"/>
+              </a:rPr>
+              <a:t>The arrows between p3 and vs1, p5 and vs2 in the brown </a:t>
+            </a:r>
+          </a:p>
+          <a:p>
+            <a:pPr marL="914400" lvl="2" indent="0">
+              <a:lnSpc>
+                <a:spcPct val="150000"/>
+              </a:lnSpc>
+              <a:buNone/>
+            </a:pPr>
+            <a:r>
+              <a:rPr lang="en-US" altLang="zh-TW" sz="1600" dirty="0">
+                <a:latin typeface="+mj-lt"/>
+              </a:rPr>
+              <a:t>     box are the inner gradient for this 6-pin net.</a:t>
+            </a:r>
+          </a:p>
+        </p:txBody>
+      </p:sp>
+      <p:sp>
+        <p:nvSpPr>
+          <p:cNvPr id="4" name="投影片編號版面配置區 3">
+            <a:extLst>
+              <a:ext uri="{FF2B5EF4-FFF2-40B4-BE49-F238E27FC236}">
+                <a16:creationId xmlns:a16="http://schemas.microsoft.com/office/drawing/2014/main" id="{CB5CB808-F672-CCA0-9EBD-A275B9A0C14B}"/>
+              </a:ext>
+            </a:extLst>
+          </p:cNvPr>
+          <p:cNvSpPr>
+            <a:spLocks noGrp="1"/>
+          </p:cNvSpPr>
+          <p:nvPr>
+            <p:ph type="sldNum" sz="quarter" idx="12"/>
+          </p:nvPr>
+        </p:nvSpPr>
+        <p:spPr/>
+        <p:txBody>
+          <a:bodyPr/>
+          <a:lstStyle/>
+          <a:p>
+            <a:fld id="{666274A1-CF9C-426A-8DD4-B13ED0C24231}" type="slidenum">
+              <a:rPr lang="en-US" smtClean="0"/>
+              <a:t>10</a:t>
+            </a:fld>
+            <a:endParaRPr lang="en-US"/>
+          </a:p>
+        </p:txBody>
+      </p:sp>
+      <p:grpSp>
+        <p:nvGrpSpPr>
+          <p:cNvPr id="12" name="群組 11">
+            <a:extLst>
+              <a:ext uri="{FF2B5EF4-FFF2-40B4-BE49-F238E27FC236}">
+                <a16:creationId xmlns:a16="http://schemas.microsoft.com/office/drawing/2014/main" id="{B1B6CCF5-575C-0D8F-7E53-DD244EFD98CC}"/>
+              </a:ext>
+            </a:extLst>
+          </p:cNvPr>
+          <p:cNvGrpSpPr/>
+          <p:nvPr/>
+        </p:nvGrpSpPr>
+        <p:grpSpPr>
+          <a:xfrm>
+            <a:off x="7249754" y="4367213"/>
+            <a:ext cx="4597341" cy="2354262"/>
+            <a:chOff x="5308659" y="2993818"/>
+            <a:chExt cx="6233310" cy="3324225"/>
+          </a:xfrm>
+        </p:grpSpPr>
+        <p:pic>
+          <p:nvPicPr>
+            <p:cNvPr id="13" name="圖片 12">
+              <a:extLst>
+                <a:ext uri="{FF2B5EF4-FFF2-40B4-BE49-F238E27FC236}">
+                  <a16:creationId xmlns:a16="http://schemas.microsoft.com/office/drawing/2014/main" id="{9E36AB84-E728-8F68-68CD-54CCFD16CE88}"/>
+                </a:ext>
+              </a:extLst>
+            </p:cNvPr>
+            <p:cNvPicPr>
+              <a:picLocks noChangeAspect="1"/>
+            </p:cNvPicPr>
+            <p:nvPr/>
+          </p:nvPicPr>
+          <p:blipFill rotWithShape="1">
+            <a:blip r:embed="rId3"/>
+            <a:srcRect t="1431"/>
+            <a:stretch/>
+          </p:blipFill>
+          <p:spPr>
+            <a:xfrm>
+              <a:off x="5308659" y="2993818"/>
+              <a:ext cx="6233310" cy="3324225"/>
+            </a:xfrm>
+            <a:prstGeom prst="rect">
+              <a:avLst/>
+            </a:prstGeom>
+          </p:spPr>
+        </p:pic>
+        <p:sp>
+          <p:nvSpPr>
+            <p:cNvPr id="14" name="文字方塊 13">
+              <a:extLst>
+                <a:ext uri="{FF2B5EF4-FFF2-40B4-BE49-F238E27FC236}">
+                  <a16:creationId xmlns:a16="http://schemas.microsoft.com/office/drawing/2014/main" id="{CE5EBA37-AD53-C662-112B-C2B8AE7B60A0}"/>
+                </a:ext>
+              </a:extLst>
+            </p:cNvPr>
+            <p:cNvSpPr txBox="1"/>
+            <p:nvPr/>
+          </p:nvSpPr>
+          <p:spPr>
+            <a:xfrm>
+              <a:off x="6343048" y="3955983"/>
+              <a:ext cx="671979" cy="369332"/>
+            </a:xfrm>
+            <a:prstGeom prst="rect">
+              <a:avLst/>
+            </a:prstGeom>
+            <a:noFill/>
+          </p:spPr>
+          <p:txBody>
+            <a:bodyPr wrap="none" rtlCol="0">
+              <a:spAutoFit/>
+            </a:bodyPr>
+            <a:lstStyle/>
+            <a:p>
+              <a:r>
+                <a:rPr lang="en-US" altLang="zh-TW" dirty="0"/>
+                <a:t>trunk</a:t>
+              </a:r>
+              <a:endParaRPr lang="zh-TW" altLang="en-US" dirty="0"/>
+            </a:p>
+          </p:txBody>
+        </p:sp>
+        <p:sp>
+          <p:nvSpPr>
+            <p:cNvPr id="15" name="文字方塊 14">
+              <a:extLst>
+                <a:ext uri="{FF2B5EF4-FFF2-40B4-BE49-F238E27FC236}">
+                  <a16:creationId xmlns:a16="http://schemas.microsoft.com/office/drawing/2014/main" id="{343F5245-6538-83AB-6BC5-983C35683223}"/>
+                </a:ext>
+              </a:extLst>
+            </p:cNvPr>
+            <p:cNvSpPr txBox="1"/>
+            <p:nvPr/>
+          </p:nvSpPr>
+          <p:spPr>
+            <a:xfrm>
+              <a:off x="6437697" y="4868668"/>
+              <a:ext cx="813043" cy="369332"/>
+            </a:xfrm>
+            <a:prstGeom prst="rect">
+              <a:avLst/>
+            </a:prstGeom>
+            <a:noFill/>
+          </p:spPr>
+          <p:txBody>
+            <a:bodyPr wrap="none" rtlCol="0">
+              <a:spAutoFit/>
+            </a:bodyPr>
+            <a:lstStyle/>
+            <a:p>
+              <a:r>
+                <a:rPr lang="en-US" altLang="zh-TW" dirty="0">
+                  <a:solidFill>
+                    <a:srgbClr val="00B0F0"/>
+                  </a:solidFill>
+                </a:rPr>
+                <a:t>branch</a:t>
+              </a:r>
+              <a:endParaRPr lang="zh-TW" altLang="en-US" dirty="0">
+                <a:solidFill>
+                  <a:srgbClr val="00B0F0"/>
+                </a:solidFill>
+              </a:endParaRPr>
+            </a:p>
+          </p:txBody>
+        </p:sp>
+      </p:grpSp>
+    </p:spTree>
+    <p:extLst>
+      <p:ext uri="{BB962C8B-B14F-4D97-AF65-F5344CB8AC3E}">
+        <p14:creationId xmlns:p14="http://schemas.microsoft.com/office/powerpoint/2010/main" val="3571637749"/>
+      </p:ext>
+    </p:extLst>
+  </p:cSld>
+  <p:clrMapOvr>
+    <a:masterClrMapping/>
+  </p:clrMapOvr>
+</p:sld>
+</file>
+
+<file path=ppt/slides/slide12.xml><?xml version="1.0" encoding="utf-8"?>
+<p:sld xmlns:a="http://schemas.openxmlformats.org/drawingml/2006/main" xmlns:r="http://schemas.openxmlformats.org/officeDocument/2006/relationships" xmlns:p="http://schemas.openxmlformats.org/presentationml/2006/main">
+  <p:cSld>
+    <p:spTree>
+      <p:nvGrpSpPr>
+        <p:cNvPr id="1" name="">
+          <a:extLst>
+            <a:ext uri="{FF2B5EF4-FFF2-40B4-BE49-F238E27FC236}">
+              <a16:creationId xmlns:a16="http://schemas.microsoft.com/office/drawing/2014/main" id="{0B5BB13D-C69E-59A2-05EB-E7F09FD744C5}"/>
+            </a:ext>
+          </a:extLst>
+        </p:cNvPr>
+        <p:cNvGrpSpPr/>
+        <p:nvPr/>
+      </p:nvGrpSpPr>
+      <p:grpSpPr>
+        <a:xfrm>
+          <a:off x="0" y="0"/>
+          <a:ext cx="0" cy="0"/>
+          <a:chOff x="0" y="0"/>
+          <a:chExt cx="0" cy="0"/>
+        </a:xfrm>
+      </p:grpSpPr>
+      <p:sp>
+        <p:nvSpPr>
+          <p:cNvPr id="2" name="標題 1">
+            <a:extLst>
+              <a:ext uri="{FF2B5EF4-FFF2-40B4-BE49-F238E27FC236}">
+                <a16:creationId xmlns:a16="http://schemas.microsoft.com/office/drawing/2014/main" id="{CE70F2C2-4FFD-FF70-69A1-A9422A419CBE}"/>
+              </a:ext>
+            </a:extLst>
+          </p:cNvPr>
+          <p:cNvSpPr>
+            <a:spLocks noGrp="1"/>
+          </p:cNvSpPr>
+          <p:nvPr>
+            <p:ph type="title"/>
+          </p:nvPr>
+        </p:nvSpPr>
+        <p:spPr/>
+        <p:txBody>
+          <a:bodyPr/>
+          <a:lstStyle/>
+          <a:p>
+            <a:r>
+              <a:rPr lang="en-US" altLang="zh-TW" dirty="0"/>
+              <a:t>Proposed Algorithm - </a:t>
+            </a:r>
+            <a:r>
+              <a:rPr lang="en-US" altLang="zh-TW" sz="3200" dirty="0" err="1"/>
+              <a:t>StWL</a:t>
+            </a:r>
+            <a:r>
+              <a:rPr lang="en-US" altLang="zh-TW" sz="3200" dirty="0"/>
+              <a:t> Optimization in GP</a:t>
+            </a:r>
+            <a:endParaRPr lang="zh-TW" altLang="en-US" dirty="0"/>
+          </a:p>
+        </p:txBody>
+      </p:sp>
+      <p:sp>
+        <p:nvSpPr>
+          <p:cNvPr id="3" name="內容版面配置區 2">
+            <a:extLst>
+              <a:ext uri="{FF2B5EF4-FFF2-40B4-BE49-F238E27FC236}">
+                <a16:creationId xmlns:a16="http://schemas.microsoft.com/office/drawing/2014/main" id="{6FEF8CD1-1144-958E-5014-B878C6478857}"/>
+              </a:ext>
+            </a:extLst>
+          </p:cNvPr>
+          <p:cNvSpPr>
+            <a:spLocks noGrp="1"/>
+          </p:cNvSpPr>
+          <p:nvPr>
+            <p:ph idx="1"/>
+          </p:nvPr>
+        </p:nvSpPr>
+        <p:spPr/>
+        <p:txBody>
+          <a:bodyPr>
+            <a:normAutofit/>
+          </a:bodyPr>
+          <a:lstStyle/>
+          <a:p>
+            <a:pPr marL="0" indent="0">
+              <a:buNone/>
+            </a:pPr>
+            <a:r>
+              <a:rPr lang="en-US" altLang="zh-TW" sz="2200" b="1" dirty="0"/>
+              <a:t>(3)</a:t>
+            </a:r>
+            <a:r>
+              <a:rPr lang="zh-TW" altLang="en-US" sz="2200" b="1" dirty="0"/>
+              <a:t>  </a:t>
+            </a:r>
+            <a:r>
+              <a:rPr lang="en-US" altLang="zh-TW" sz="2200" b="1" dirty="0" err="1"/>
+              <a:t>StWL</a:t>
+            </a:r>
+            <a:r>
+              <a:rPr lang="en-US" altLang="zh-TW" sz="2200" b="1" dirty="0"/>
+              <a:t> Optimization in Cell Refinement</a:t>
+            </a:r>
+          </a:p>
+          <a:p>
+            <a:pPr marL="0" indent="0">
+              <a:buNone/>
+            </a:pPr>
+            <a:endParaRPr lang="en-US" altLang="zh-TW" sz="400" b="1" dirty="0"/>
+          </a:p>
+          <a:p>
+            <a:pPr lvl="1">
+              <a:lnSpc>
+                <a:spcPct val="150000"/>
+              </a:lnSpc>
+            </a:pPr>
+            <a:endParaRPr lang="en-US" altLang="zh-TW" sz="1600" dirty="0">
+              <a:latin typeface="+mj-lt"/>
+            </a:endParaRPr>
+          </a:p>
+        </p:txBody>
+      </p:sp>
+      <p:sp>
+        <p:nvSpPr>
+          <p:cNvPr id="4" name="投影片編號版面配置區 3">
+            <a:extLst>
+              <a:ext uri="{FF2B5EF4-FFF2-40B4-BE49-F238E27FC236}">
+                <a16:creationId xmlns:a16="http://schemas.microsoft.com/office/drawing/2014/main" id="{555869EE-00D9-08A8-0A08-F3D5AF564A4E}"/>
+              </a:ext>
+            </a:extLst>
+          </p:cNvPr>
+          <p:cNvSpPr>
+            <a:spLocks noGrp="1"/>
+          </p:cNvSpPr>
+          <p:nvPr>
+            <p:ph type="sldNum" sz="quarter" idx="12"/>
+          </p:nvPr>
+        </p:nvSpPr>
+        <p:spPr/>
+        <p:txBody>
+          <a:bodyPr/>
+          <a:lstStyle/>
+          <a:p>
+            <a:fld id="{666274A1-CF9C-426A-8DD4-B13ED0C24231}" type="slidenum">
+              <a:rPr lang="en-US" smtClean="0"/>
+              <a:t>11</a:t>
+            </a:fld>
+            <a:endParaRPr lang="en-US"/>
+          </a:p>
+        </p:txBody>
+      </p:sp>
+    </p:spTree>
+    <p:extLst>
+      <p:ext uri="{BB962C8B-B14F-4D97-AF65-F5344CB8AC3E}">
+        <p14:creationId xmlns:p14="http://schemas.microsoft.com/office/powerpoint/2010/main" val="3427306375"/>
+      </p:ext>
+    </p:extLst>
+  </p:cSld>
+  <p:clrMapOvr>
+    <a:masterClrMapping/>
+  </p:clrMapOvr>
+</p:sld>
+</file>
+
+<file path=ppt/slides/slide13.xml><?xml version="1.0" encoding="utf-8"?>
+<p:sld xmlns:a="http://schemas.openxmlformats.org/drawingml/2006/main" xmlns:r="http://schemas.openxmlformats.org/officeDocument/2006/relationships" xmlns:p="http://schemas.openxmlformats.org/presentationml/2006/main">
+  <p:cSld>
+    <p:spTree>
+      <p:nvGrpSpPr>
+        <p:cNvPr id="1" name=""/>
+        <p:cNvGrpSpPr/>
+        <p:nvPr/>
+      </p:nvGrpSpPr>
+      <p:grpSpPr>
+        <a:xfrm>
+          <a:off x="0" y="0"/>
+          <a:ext cx="0" cy="0"/>
+          <a:chOff x="0" y="0"/>
+          <a:chExt cx="0" cy="0"/>
+        </a:xfrm>
+      </p:grpSpPr>
+      <p:sp>
+        <p:nvSpPr>
+          <p:cNvPr id="4" name="Slide Number Placeholder 3">
+            <a:extLst>
+              <a:ext uri="{FF2B5EF4-FFF2-40B4-BE49-F238E27FC236}">
+                <a16:creationId xmlns:a16="http://schemas.microsoft.com/office/drawing/2014/main" id="{DB47E6D4-11C1-7FA3-40FD-EC8CC1AC8613}"/>
+              </a:ext>
+            </a:extLst>
+          </p:cNvPr>
+          <p:cNvSpPr>
+            <a:spLocks noGrp="1"/>
+          </p:cNvSpPr>
+          <p:nvPr>
+            <p:ph type="sldNum" sz="quarter" idx="12"/>
+          </p:nvPr>
+        </p:nvSpPr>
+        <p:spPr/>
+        <p:txBody>
+          <a:bodyPr/>
+          <a:lstStyle/>
+          <a:p>
+            <a:fld id="{666274A1-CF9C-426A-8DD4-B13ED0C24231}" type="slidenum">
+              <a:rPr lang="en-US" smtClean="0"/>
+              <a:t>12</a:t>
+            </a:fld>
+            <a:endParaRPr lang="en-US"/>
+          </a:p>
+        </p:txBody>
+      </p:sp>
+      <p:sp>
+        <p:nvSpPr>
+          <p:cNvPr id="5" name="TextBox 4">
+            <a:extLst>
+              <a:ext uri="{FF2B5EF4-FFF2-40B4-BE49-F238E27FC236}">
+                <a16:creationId xmlns:a16="http://schemas.microsoft.com/office/drawing/2014/main" id="{DE342AA9-4E4B-2420-9858-9BBA5A519307}"/>
+              </a:ext>
+            </a:extLst>
+          </p:cNvPr>
+          <p:cNvSpPr txBox="1"/>
+          <p:nvPr/>
+        </p:nvSpPr>
+        <p:spPr>
+          <a:xfrm>
+            <a:off x="2627743" y="2967335"/>
+            <a:ext cx="6936514" cy="923330"/>
+          </a:xfrm>
+          <a:prstGeom prst="rect">
+            <a:avLst/>
+          </a:prstGeom>
+          <a:noFill/>
+        </p:spPr>
+        <p:txBody>
+          <a:bodyPr wrap="none" rtlCol="0">
+            <a:spAutoFit/>
+          </a:bodyPr>
+          <a:lstStyle/>
+          <a:p>
+            <a:r>
+              <a:rPr lang="en-US" altLang="zh-TW" sz="5400" dirty="0">
+                <a:latin typeface="Times" panose="02020603050405020304" pitchFamily="18" charset="0"/>
+                <a:cs typeface="Times" panose="02020603050405020304" pitchFamily="18" charset="0"/>
+              </a:rPr>
+              <a:t>Thank you for listening!</a:t>
+            </a:r>
+            <a:endParaRPr lang="zh-TW" altLang="en-US" sz="5400" dirty="0">
+              <a:latin typeface="Times" panose="02020603050405020304" pitchFamily="18" charset="0"/>
+              <a:cs typeface="Times" panose="02020603050405020304" pitchFamily="18" charset="0"/>
+            </a:endParaRPr>
+          </a:p>
+        </p:txBody>
+      </p:sp>
+    </p:spTree>
+    <p:extLst>
+      <p:ext uri="{BB962C8B-B14F-4D97-AF65-F5344CB8AC3E}">
+        <p14:creationId xmlns:p14="http://schemas.microsoft.com/office/powerpoint/2010/main" val="1947749228"/>
+      </p:ext>
+    </p:extLst>
+  </p:cSld>
+  <p:clrMapOvr>
+    <a:masterClrMapping/>
+  </p:clrMapOvr>
+</p:sld>
+</file>
+
 <file path=ppt/slides/slide2.xml><?xml version="1.0" encoding="utf-8"?>
 <p:sld xmlns:a="http://schemas.openxmlformats.org/drawingml/2006/main" xmlns:r="http://schemas.openxmlformats.org/officeDocument/2006/relationships" xmlns:p="http://schemas.openxmlformats.org/presentationml/2006/main">
   <p:cSld>
@@ -5931,6 +8014,17 @@
             <a:r>
               <a:rPr lang="en-US" altLang="zh-TW" sz="2400" dirty="0"/>
               <a:t>Preliminaries</a:t>
+            </a:r>
+          </a:p>
+          <a:p>
+            <a:pPr>
+              <a:lnSpc>
+                <a:spcPct val="150000"/>
+              </a:lnSpc>
+            </a:pPr>
+            <a:r>
+              <a:rPr lang="en-US" altLang="zh-TW" sz="2400" dirty="0"/>
+              <a:t>Proposed Algorithm</a:t>
             </a:r>
             <a:endParaRPr lang="zh-TW" altLang="en-US" sz="2400" dirty="0"/>
           </a:p>
@@ -6030,8 +8124,8 @@
           </a:p>
         </p:txBody>
       </p:sp>
-      <mc:AlternateContent xmlns:mc="http://schemas.openxmlformats.org/markup-compatibility/2006">
-        <mc:Choice xmlns:a14="http://schemas.microsoft.com/office/drawing/2010/main" Requires="a14">
+      <mc:AlternateContent xmlns:mc="http://schemas.openxmlformats.org/markup-compatibility/2006" xmlns:a14="http://schemas.microsoft.com/office/drawing/2010/main">
+        <mc:Choice Requires="a14">
           <p:sp>
             <p:nvSpPr>
               <p:cNvPr id="3" name="內容版面配置區 2">
@@ -6086,7 +8180,7 @@
                   <m:oMath xmlns:m="http://schemas.openxmlformats.org/officeDocument/2006/math">
                     <m:r>
                       <a:rPr lang="en-US" altLang="zh-TW" sz="2200" i="1" smtClean="0">
-                        <a:latin typeface="+mj-lt"/>
+                        <a:latin typeface="Cambria Math" panose="02040503050406030204" pitchFamily="18" charset="0"/>
                         <a:ea typeface="Cambria Math" panose="02040503050406030204" pitchFamily="18" charset="0"/>
                       </a:rPr>
                       <m:t>≥</m:t>
@@ -6222,7 +8316,7 @@
             </p:txBody>
           </p:sp>
         </mc:Choice>
-        <mc:Fallback>
+        <mc:Fallback xmlns="">
           <p:sp>
             <p:nvSpPr>
               <p:cNvPr id="3" name="內容版面配置區 2">
@@ -6729,11 +8823,11 @@
           <a:p>
             <a:r>
               <a:rPr lang="en-US" altLang="zh-TW" dirty="0"/>
-              <a:t>Preliminaries </a:t>
+              <a:t>Preliminaries -</a:t>
             </a:r>
             <a:r>
               <a:rPr lang="en-US" altLang="zh-TW" sz="4000" dirty="0"/>
-              <a:t>- </a:t>
+              <a:t> </a:t>
             </a:r>
             <a:r>
               <a:rPr lang="en-US" altLang="zh-TW" sz="3200" dirty="0"/>
@@ -6926,8 +9020,8 @@
           </a:p>
         </p:txBody>
       </p:sp>
-      <mc:AlternateContent xmlns:mc="http://schemas.openxmlformats.org/markup-compatibility/2006">
-        <mc:Choice xmlns:a14="http://schemas.microsoft.com/office/drawing/2010/main" Requires="a14">
+      <mc:AlternateContent xmlns:mc="http://schemas.openxmlformats.org/markup-compatibility/2006" xmlns:a14="http://schemas.microsoft.com/office/drawing/2010/main">
+        <mc:Choice Requires="a14">
           <p:sp>
             <p:nvSpPr>
               <p:cNvPr id="3" name="內容版面配置區 2">
@@ -7429,7 +9523,7 @@
             </p:txBody>
           </p:sp>
         </mc:Choice>
-        <mc:Fallback>
+        <mc:Fallback xmlns="">
           <p:sp>
             <p:nvSpPr>
               <p:cNvPr id="3" name="內容版面配置區 2">
@@ -7532,8 +9626,8 @@
           </a:prstGeom>
         </p:spPr>
       </p:pic>
-      <mc:AlternateContent xmlns:mc="http://schemas.openxmlformats.org/markup-compatibility/2006">
-        <mc:Choice xmlns:a14="http://schemas.microsoft.com/office/drawing/2010/main" Requires="a14">
+      <mc:AlternateContent xmlns:mc="http://schemas.openxmlformats.org/markup-compatibility/2006" xmlns:a14="http://schemas.microsoft.com/office/drawing/2010/main">
+        <mc:Choice Requires="a14">
           <p:sp>
             <p:nvSpPr>
               <p:cNvPr id="9" name="文字方塊 8">
@@ -7567,6 +9661,7 @@
               </a:bodyPr>
               <a:lstStyle/>
               <a:p>
+                <a:pPr/>
                 <a14:m>
                   <m:oMathPara xmlns:m="http://schemas.openxmlformats.org/officeDocument/2006/math">
                     <m:oMathParaPr>
@@ -7593,6 +9688,7 @@
                 </a:endParaRPr>
               </a:p>
               <a:p>
+                <a:pPr/>
                 <a14:m>
                   <m:oMathPara xmlns:m="http://schemas.openxmlformats.org/officeDocument/2006/math">
                     <m:oMathParaPr>
@@ -7615,13 +9711,13 @@
                         <a:rPr lang="en-US" altLang="zh-TW" sz="1600" b="0" i="1" smtClean="0">
                           <a:latin typeface="Cambria Math" panose="02040503050406030204" pitchFamily="18" charset="0"/>
                         </a:rPr>
-                        <m:t>𝑚𝑎𝑥𝑡</m:t>
+                        <m:t>𝑚𝑎𝑥𝑡𝑒</m:t>
                       </m:r>
                       <m:r>
                         <a:rPr lang="en-US" altLang="zh-TW" sz="1600" i="1">
                           <a:latin typeface="Cambria Math" panose="02040503050406030204" pitchFamily="18" charset="0"/>
                         </a:rPr>
-                        <m:t>𝑒𝑟𝑚</m:t>
+                        <m:t>𝑟𝑚</m:t>
                       </m:r>
                       <m:r>
                         <a:rPr lang="en-US" altLang="zh-TW" sz="1600" i="1">
@@ -7678,7 +9774,7 @@
             </p:txBody>
           </p:sp>
         </mc:Choice>
-        <mc:Fallback>
+        <mc:Fallback xmlns="">
           <p:sp>
             <p:nvSpPr>
               <p:cNvPr id="9" name="文字方塊 8">
@@ -7728,8 +9824,8 @@
           </p:sp>
         </mc:Fallback>
       </mc:AlternateContent>
-      <mc:AlternateContent xmlns:mc="http://schemas.openxmlformats.org/markup-compatibility/2006">
-        <mc:Choice xmlns:a14="http://schemas.microsoft.com/office/drawing/2010/main" Requires="a14">
+      <mc:AlternateContent xmlns:mc="http://schemas.openxmlformats.org/markup-compatibility/2006" xmlns:a14="http://schemas.microsoft.com/office/drawing/2010/main">
+        <mc:Choice Requires="a14">
           <p:sp>
             <p:nvSpPr>
               <p:cNvPr id="10" name="文字方塊 9">
@@ -7763,6 +9859,7 @@
               </a:bodyPr>
               <a:lstStyle/>
               <a:p>
+                <a:pPr/>
                 <a14:m>
                   <m:oMathPara xmlns:m="http://schemas.openxmlformats.org/officeDocument/2006/math">
                     <m:oMathParaPr>
@@ -7789,6 +9886,7 @@
                 </a:endParaRPr>
               </a:p>
               <a:p>
+                <a:pPr/>
                 <a14:m>
                   <m:oMathPara xmlns:m="http://schemas.openxmlformats.org/officeDocument/2006/math">
                     <m:oMathParaPr>
@@ -7811,13 +9909,13 @@
                         <a:rPr lang="en-US" altLang="zh-TW" sz="1600" b="0" i="1" smtClean="0">
                           <a:latin typeface="Cambria Math" panose="02040503050406030204" pitchFamily="18" charset="0"/>
                         </a:rPr>
-                        <m:t>𝑚𝑖𝑛𝑡</m:t>
+                        <m:t>𝑚𝑖𝑛𝑡𝑒</m:t>
                       </m:r>
                       <m:r>
                         <a:rPr lang="en-US" altLang="zh-TW" sz="1600" i="1">
                           <a:latin typeface="Cambria Math" panose="02040503050406030204" pitchFamily="18" charset="0"/>
                         </a:rPr>
-                        <m:t>𝑒𝑟𝑚</m:t>
+                        <m:t>𝑟𝑚</m:t>
                       </m:r>
                       <m:r>
                         <a:rPr lang="en-US" altLang="zh-TW" sz="1600" i="1">
@@ -7874,7 +9972,7 @@
             </p:txBody>
           </p:sp>
         </mc:Choice>
-        <mc:Fallback>
+        <mc:Fallback xmlns="">
           <p:sp>
             <p:nvSpPr>
               <p:cNvPr id="10" name="文字方塊 9">
@@ -7956,10 +10054,160 @@
       </p:grpSpPr>
       <p:sp>
         <p:nvSpPr>
-          <p:cNvPr id="4" name="Slide Number Placeholder 3">
-            <a:extLst>
-              <a:ext uri="{FF2B5EF4-FFF2-40B4-BE49-F238E27FC236}">
-                <a16:creationId xmlns:a16="http://schemas.microsoft.com/office/drawing/2014/main" id="{DB47E6D4-11C1-7FA3-40FD-EC8CC1AC8613}"/>
+          <p:cNvPr id="2" name="標題 1">
+            <a:extLst>
+              <a:ext uri="{FF2B5EF4-FFF2-40B4-BE49-F238E27FC236}">
+                <a16:creationId xmlns:a16="http://schemas.microsoft.com/office/drawing/2014/main" id="{0F831D18-68BA-6CAD-A135-082A87612D6A}"/>
+              </a:ext>
+            </a:extLst>
+          </p:cNvPr>
+          <p:cNvSpPr>
+            <a:spLocks noGrp="1"/>
+          </p:cNvSpPr>
+          <p:nvPr>
+            <p:ph type="title"/>
+          </p:nvPr>
+        </p:nvSpPr>
+        <p:spPr/>
+        <p:txBody>
+          <a:bodyPr/>
+          <a:lstStyle/>
+          <a:p>
+            <a:r>
+              <a:rPr lang="en-US" altLang="zh-TW" dirty="0"/>
+              <a:t>Preliminaries - </a:t>
+            </a:r>
+            <a:r>
+              <a:rPr lang="en-US" altLang="zh-TW" sz="3200" dirty="0"/>
+              <a:t>Analysis of HPWL &amp; RSMT Topology</a:t>
+            </a:r>
+            <a:endParaRPr lang="zh-TW" altLang="en-US" dirty="0"/>
+          </a:p>
+        </p:txBody>
+      </p:sp>
+      <p:sp>
+        <p:nvSpPr>
+          <p:cNvPr id="3" name="內容版面配置區 2">
+            <a:extLst>
+              <a:ext uri="{FF2B5EF4-FFF2-40B4-BE49-F238E27FC236}">
+                <a16:creationId xmlns:a16="http://schemas.microsoft.com/office/drawing/2014/main" id="{2616D49B-78C3-75F7-F9AE-BEAE9208777F}"/>
+              </a:ext>
+            </a:extLst>
+          </p:cNvPr>
+          <p:cNvSpPr>
+            <a:spLocks noGrp="1"/>
+          </p:cNvSpPr>
+          <p:nvPr>
+            <p:ph idx="1"/>
+          </p:nvPr>
+        </p:nvSpPr>
+        <p:spPr>
+          <a:xfrm>
+            <a:off x="838200" y="1620000"/>
+            <a:ext cx="10515600" cy="4351338"/>
+          </a:xfrm>
+        </p:spPr>
+        <p:txBody>
+          <a:bodyPr>
+            <a:normAutofit/>
+          </a:bodyPr>
+          <a:lstStyle/>
+          <a:p>
+            <a:pPr>
+              <a:lnSpc>
+                <a:spcPct val="150000"/>
+              </a:lnSpc>
+            </a:pPr>
+            <a:r>
+              <a:rPr lang="en-US" altLang="zh-TW" sz="2200" dirty="0"/>
+              <a:t>HPWL model ignores the distribution of interior points, thus losing  track of the practical gradient guidance.</a:t>
+            </a:r>
+          </a:p>
+          <a:p>
+            <a:pPr>
+              <a:lnSpc>
+                <a:spcPct val="150000"/>
+              </a:lnSpc>
+            </a:pPr>
+            <a:r>
+              <a:rPr lang="en-US" altLang="zh-TW" sz="2200" dirty="0"/>
+              <a:t>Trunks:</a:t>
+            </a:r>
+          </a:p>
+          <a:p>
+            <a:pPr lvl="1">
+              <a:lnSpc>
+                <a:spcPct val="100000"/>
+              </a:lnSpc>
+            </a:pPr>
+            <a:r>
+              <a:rPr lang="en-US" altLang="zh-TW" sz="1800" dirty="0"/>
+              <a:t>Directly connected to the input and </a:t>
+            </a:r>
+          </a:p>
+          <a:p>
+            <a:pPr marL="457200" lvl="1" indent="0">
+              <a:lnSpc>
+                <a:spcPct val="100000"/>
+              </a:lnSpc>
+              <a:buNone/>
+            </a:pPr>
+            <a:r>
+              <a:rPr lang="en-US" altLang="zh-TW" sz="1800" dirty="0"/>
+              <a:t>    output pins (Physical pins).</a:t>
+            </a:r>
+          </a:p>
+          <a:p>
+            <a:pPr>
+              <a:lnSpc>
+                <a:spcPct val="150000"/>
+              </a:lnSpc>
+            </a:pPr>
+            <a:r>
+              <a:rPr lang="en-US" altLang="zh-TW" sz="2200" dirty="0"/>
+              <a:t>Branches:</a:t>
+            </a:r>
+          </a:p>
+          <a:p>
+            <a:pPr lvl="1">
+              <a:lnSpc>
+                <a:spcPct val="100000"/>
+              </a:lnSpc>
+            </a:pPr>
+            <a:r>
+              <a:rPr lang="en-US" altLang="zh-TW" sz="1800" dirty="0"/>
+              <a:t>The remaining part composed </a:t>
+            </a:r>
+          </a:p>
+          <a:p>
+            <a:pPr marL="457200" lvl="1" indent="0">
+              <a:lnSpc>
+                <a:spcPct val="100000"/>
+              </a:lnSpc>
+              <a:buNone/>
+            </a:pPr>
+            <a:r>
+              <a:rPr lang="en-US" altLang="zh-TW" sz="1800" dirty="0"/>
+              <a:t>    of Steiner points.</a:t>
+            </a:r>
+          </a:p>
+          <a:p>
+            <a:pPr marL="457200" lvl="1" indent="0">
+              <a:lnSpc>
+                <a:spcPct val="100000"/>
+              </a:lnSpc>
+              <a:buNone/>
+            </a:pPr>
+            <a:endParaRPr lang="en-US" altLang="zh-TW" sz="1800" dirty="0"/>
+          </a:p>
+        </p:txBody>
+      </p:sp>
+      <p:sp>
+        <p:nvSpPr>
+          <p:cNvPr id="4" name="投影片編號版面配置區 3">
+            <a:extLst>
+              <a:ext uri="{FF2B5EF4-FFF2-40B4-BE49-F238E27FC236}">
+                <a16:creationId xmlns:a16="http://schemas.microsoft.com/office/drawing/2014/main" id="{6767C877-A462-E6C9-6768-ABD5B2CBADBD}"/>
               </a:ext>
             </a:extLst>
           </p:cNvPr>
@@ -7979,16 +10227,722 @@
               <a:rPr lang="en-US" smtClean="0"/>
               <a:t>6</a:t>
             </a:fld>
+            <a:endParaRPr lang="en-US" dirty="0"/>
+          </a:p>
+        </p:txBody>
+      </p:sp>
+      <p:grpSp>
+        <p:nvGrpSpPr>
+          <p:cNvPr id="9" name="群組 8">
+            <a:extLst>
+              <a:ext uri="{FF2B5EF4-FFF2-40B4-BE49-F238E27FC236}">
+                <a16:creationId xmlns:a16="http://schemas.microsoft.com/office/drawing/2014/main" id="{0583B00F-ADB0-E79E-3CEC-03D11515ED74}"/>
+              </a:ext>
+            </a:extLst>
+          </p:cNvPr>
+          <p:cNvGrpSpPr/>
+          <p:nvPr/>
+        </p:nvGrpSpPr>
+        <p:grpSpPr>
+          <a:xfrm>
+            <a:off x="5308659" y="2945563"/>
+            <a:ext cx="6233310" cy="3372480"/>
+            <a:chOff x="5308659" y="2945563"/>
+            <a:chExt cx="6233310" cy="3372480"/>
+          </a:xfrm>
+        </p:grpSpPr>
+        <p:pic>
+          <p:nvPicPr>
+            <p:cNvPr id="6" name="圖片 5">
+              <a:extLst>
+                <a:ext uri="{FF2B5EF4-FFF2-40B4-BE49-F238E27FC236}">
+                  <a16:creationId xmlns:a16="http://schemas.microsoft.com/office/drawing/2014/main" id="{70B81346-50B0-EEC4-33DE-88425CC133EE}"/>
+                </a:ext>
+              </a:extLst>
+            </p:cNvPr>
+            <p:cNvPicPr>
+              <a:picLocks noChangeAspect="1"/>
+            </p:cNvPicPr>
+            <p:nvPr/>
+          </p:nvPicPr>
+          <p:blipFill>
+            <a:blip r:embed="rId3"/>
+            <a:stretch>
+              <a:fillRect/>
+            </a:stretch>
+          </p:blipFill>
+          <p:spPr>
+            <a:xfrm>
+              <a:off x="5308659" y="2945563"/>
+              <a:ext cx="6233310" cy="3372480"/>
+            </a:xfrm>
+            <a:prstGeom prst="rect">
+              <a:avLst/>
+            </a:prstGeom>
+          </p:spPr>
+        </p:pic>
+        <p:sp>
+          <p:nvSpPr>
+            <p:cNvPr id="7" name="文字方塊 6">
+              <a:extLst>
+                <a:ext uri="{FF2B5EF4-FFF2-40B4-BE49-F238E27FC236}">
+                  <a16:creationId xmlns:a16="http://schemas.microsoft.com/office/drawing/2014/main" id="{A2175001-EDDA-6079-E69D-17656E90EE9D}"/>
+                </a:ext>
+              </a:extLst>
+            </p:cNvPr>
+            <p:cNvSpPr txBox="1"/>
+            <p:nvPr/>
+          </p:nvSpPr>
+          <p:spPr>
+            <a:xfrm>
+              <a:off x="6343048" y="3955983"/>
+              <a:ext cx="671979" cy="369332"/>
+            </a:xfrm>
+            <a:prstGeom prst="rect">
+              <a:avLst/>
+            </a:prstGeom>
+            <a:noFill/>
+          </p:spPr>
+          <p:txBody>
+            <a:bodyPr wrap="none" rtlCol="0">
+              <a:spAutoFit/>
+            </a:bodyPr>
+            <a:lstStyle/>
+            <a:p>
+              <a:r>
+                <a:rPr lang="en-US" altLang="zh-TW" dirty="0"/>
+                <a:t>trunk</a:t>
+              </a:r>
+              <a:endParaRPr lang="zh-TW" altLang="en-US" dirty="0"/>
+            </a:p>
+          </p:txBody>
+        </p:sp>
+        <p:sp>
+          <p:nvSpPr>
+            <p:cNvPr id="8" name="文字方塊 7">
+              <a:extLst>
+                <a:ext uri="{FF2B5EF4-FFF2-40B4-BE49-F238E27FC236}">
+                  <a16:creationId xmlns:a16="http://schemas.microsoft.com/office/drawing/2014/main" id="{E36D7AA6-E736-FAD2-6BD1-9600EDAEA6D2}"/>
+                </a:ext>
+              </a:extLst>
+            </p:cNvPr>
+            <p:cNvSpPr txBox="1"/>
+            <p:nvPr/>
+          </p:nvSpPr>
+          <p:spPr>
+            <a:xfrm>
+              <a:off x="6437697" y="4868668"/>
+              <a:ext cx="813043" cy="369332"/>
+            </a:xfrm>
+            <a:prstGeom prst="rect">
+              <a:avLst/>
+            </a:prstGeom>
+            <a:noFill/>
+          </p:spPr>
+          <p:txBody>
+            <a:bodyPr wrap="none" rtlCol="0">
+              <a:spAutoFit/>
+            </a:bodyPr>
+            <a:lstStyle/>
+            <a:p>
+              <a:r>
+                <a:rPr lang="en-US" altLang="zh-TW" dirty="0">
+                  <a:solidFill>
+                    <a:srgbClr val="00B0F0"/>
+                  </a:solidFill>
+                </a:rPr>
+                <a:t>branch</a:t>
+              </a:r>
+              <a:endParaRPr lang="zh-TW" altLang="en-US" dirty="0">
+                <a:solidFill>
+                  <a:srgbClr val="00B0F0"/>
+                </a:solidFill>
+              </a:endParaRPr>
+            </a:p>
+          </p:txBody>
+        </p:sp>
+      </p:grpSp>
+    </p:spTree>
+    <p:extLst>
+      <p:ext uri="{BB962C8B-B14F-4D97-AF65-F5344CB8AC3E}">
+        <p14:creationId xmlns:p14="http://schemas.microsoft.com/office/powerpoint/2010/main" val="1285625215"/>
+      </p:ext>
+    </p:extLst>
+  </p:cSld>
+  <p:clrMapOvr>
+    <a:masterClrMapping/>
+  </p:clrMapOvr>
+</p:sld>
+</file>
+
+<file path=ppt/slides/slide8.xml><?xml version="1.0" encoding="utf-8"?>
+<p:sld xmlns:a="http://schemas.openxmlformats.org/drawingml/2006/main" xmlns:r="http://schemas.openxmlformats.org/officeDocument/2006/relationships" xmlns:p="http://schemas.openxmlformats.org/presentationml/2006/main">
+  <p:cSld>
+    <p:spTree>
+      <p:nvGrpSpPr>
+        <p:cNvPr id="1" name=""/>
+        <p:cNvGrpSpPr/>
+        <p:nvPr/>
+      </p:nvGrpSpPr>
+      <p:grpSpPr>
+        <a:xfrm>
+          <a:off x="0" y="0"/>
+          <a:ext cx="0" cy="0"/>
+          <a:chOff x="0" y="0"/>
+          <a:chExt cx="0" cy="0"/>
+        </a:xfrm>
+      </p:grpSpPr>
+      <p:sp>
+        <p:nvSpPr>
+          <p:cNvPr id="2" name="標題 1">
+            <a:extLst>
+              <a:ext uri="{FF2B5EF4-FFF2-40B4-BE49-F238E27FC236}">
+                <a16:creationId xmlns:a16="http://schemas.microsoft.com/office/drawing/2014/main" id="{E3186F28-1D48-455C-350F-1CFBF2EA6D4C}"/>
+              </a:ext>
+            </a:extLst>
+          </p:cNvPr>
+          <p:cNvSpPr>
+            <a:spLocks noGrp="1"/>
+          </p:cNvSpPr>
+          <p:nvPr>
+            <p:ph type="title"/>
+          </p:nvPr>
+        </p:nvSpPr>
+        <p:spPr/>
+        <p:txBody>
+          <a:bodyPr/>
+          <a:lstStyle/>
+          <a:p>
+            <a:r>
+              <a:rPr lang="en-US" altLang="zh-TW" dirty="0"/>
+              <a:t>Proposed Algorithm</a:t>
+            </a:r>
+            <a:endParaRPr lang="zh-TW" altLang="en-US" dirty="0"/>
+          </a:p>
+        </p:txBody>
+      </p:sp>
+      <p:sp>
+        <p:nvSpPr>
+          <p:cNvPr id="3" name="內容版面配置區 2">
+            <a:extLst>
+              <a:ext uri="{FF2B5EF4-FFF2-40B4-BE49-F238E27FC236}">
+                <a16:creationId xmlns:a16="http://schemas.microsoft.com/office/drawing/2014/main" id="{515AC8EE-FBDF-D8D3-470A-E5B02B96A3C4}"/>
+              </a:ext>
+            </a:extLst>
+          </p:cNvPr>
+          <p:cNvSpPr>
+            <a:spLocks noGrp="1"/>
+          </p:cNvSpPr>
+          <p:nvPr>
+            <p:ph idx="1"/>
+          </p:nvPr>
+        </p:nvSpPr>
+        <p:spPr/>
+        <p:txBody>
+          <a:bodyPr>
+            <a:normAutofit/>
+          </a:bodyPr>
+          <a:lstStyle/>
+          <a:p>
+            <a:pPr marL="514350" indent="-514350">
+              <a:buFont typeface="+mj-lt"/>
+              <a:buAutoNum type="alphaUcPeriod"/>
+            </a:pPr>
+            <a:r>
+              <a:rPr lang="en-US" altLang="zh-TW" sz="2000" dirty="0" err="1"/>
+              <a:t>StWL</a:t>
+            </a:r>
+            <a:r>
+              <a:rPr lang="en-US" altLang="zh-TW" sz="2000" dirty="0"/>
+              <a:t> Optimization in Global Placement.</a:t>
+            </a:r>
+          </a:p>
+          <a:p>
+            <a:pPr marL="0" indent="0">
+              <a:buNone/>
+            </a:pPr>
+            <a:endParaRPr lang="en-US" altLang="zh-TW" sz="2200" dirty="0"/>
+          </a:p>
+          <a:p>
+            <a:pPr marL="457200" indent="-457200">
+              <a:buFont typeface="+mj-lt"/>
+              <a:buAutoNum type="alphaUcPeriod" startAt="2"/>
+            </a:pPr>
+            <a:r>
+              <a:rPr lang="en-US" altLang="zh-TW" sz="2000" dirty="0"/>
+              <a:t> </a:t>
+            </a:r>
+            <a:r>
+              <a:rPr lang="en-US" altLang="zh-TW" sz="2000" dirty="0" err="1"/>
+              <a:t>StWL</a:t>
+            </a:r>
+            <a:r>
+              <a:rPr lang="en-US" altLang="zh-TW" sz="2000" dirty="0"/>
+              <a:t> Optimization in Cell Refinement.</a:t>
+            </a:r>
+            <a:endParaRPr lang="zh-TW" altLang="en-US" sz="2000" dirty="0"/>
+          </a:p>
+        </p:txBody>
+      </p:sp>
+      <p:sp>
+        <p:nvSpPr>
+          <p:cNvPr id="4" name="投影片編號版面配置區 3">
+            <a:extLst>
+              <a:ext uri="{FF2B5EF4-FFF2-40B4-BE49-F238E27FC236}">
+                <a16:creationId xmlns:a16="http://schemas.microsoft.com/office/drawing/2014/main" id="{9BB63E83-31A6-38EE-9E71-A7B0D38B2584}"/>
+              </a:ext>
+            </a:extLst>
+          </p:cNvPr>
+          <p:cNvSpPr>
+            <a:spLocks noGrp="1"/>
+          </p:cNvSpPr>
+          <p:nvPr>
+            <p:ph type="sldNum" sz="quarter" idx="12"/>
+          </p:nvPr>
+        </p:nvSpPr>
+        <p:spPr/>
+        <p:txBody>
+          <a:bodyPr/>
+          <a:lstStyle/>
+          <a:p>
+            <a:fld id="{666274A1-CF9C-426A-8DD4-B13ED0C24231}" type="slidenum">
+              <a:rPr lang="en-US" smtClean="0"/>
+              <a:t>7</a:t>
+            </a:fld>
             <a:endParaRPr lang="en-US"/>
           </a:p>
         </p:txBody>
       </p:sp>
-      <p:sp>
-        <p:nvSpPr>
-          <p:cNvPr id="5" name="TextBox 4">
-            <a:extLst>
-              <a:ext uri="{FF2B5EF4-FFF2-40B4-BE49-F238E27FC236}">
-                <a16:creationId xmlns:a16="http://schemas.microsoft.com/office/drawing/2014/main" id="{DE342AA9-4E4B-2420-9858-9BBA5A519307}"/>
+      <p:pic>
+        <p:nvPicPr>
+          <p:cNvPr id="6" name="圖片 5">
+            <a:extLst>
+              <a:ext uri="{FF2B5EF4-FFF2-40B4-BE49-F238E27FC236}">
+                <a16:creationId xmlns:a16="http://schemas.microsoft.com/office/drawing/2014/main" id="{64035916-CA11-CA2F-EB5C-56038A6AF8CE}"/>
+              </a:ext>
+            </a:extLst>
+          </p:cNvPr>
+          <p:cNvPicPr>
+            <a:picLocks noChangeAspect="1"/>
+          </p:cNvPicPr>
+          <p:nvPr/>
+        </p:nvPicPr>
+        <p:blipFill>
+          <a:blip r:embed="rId3"/>
+          <a:stretch>
+            <a:fillRect/>
+          </a:stretch>
+        </p:blipFill>
+        <p:spPr>
+          <a:xfrm>
+            <a:off x="5826551" y="365125"/>
+            <a:ext cx="5781516" cy="6040181"/>
+          </a:xfrm>
+          <a:prstGeom prst="rect">
+            <a:avLst/>
+          </a:prstGeom>
+        </p:spPr>
+      </p:pic>
+    </p:spTree>
+    <p:extLst>
+      <p:ext uri="{BB962C8B-B14F-4D97-AF65-F5344CB8AC3E}">
+        <p14:creationId xmlns:p14="http://schemas.microsoft.com/office/powerpoint/2010/main" val="2460374186"/>
+      </p:ext>
+    </p:extLst>
+  </p:cSld>
+  <p:clrMapOvr>
+    <a:masterClrMapping/>
+  </p:clrMapOvr>
+</p:sld>
+</file>
+
+<file path=ppt/slides/slide9.xml><?xml version="1.0" encoding="utf-8"?>
+<p:sld xmlns:a="http://schemas.openxmlformats.org/drawingml/2006/main" xmlns:r="http://schemas.openxmlformats.org/officeDocument/2006/relationships" xmlns:p="http://schemas.openxmlformats.org/presentationml/2006/main">
+  <p:cSld>
+    <p:spTree>
+      <p:nvGrpSpPr>
+        <p:cNvPr id="1" name=""/>
+        <p:cNvGrpSpPr/>
+        <p:nvPr/>
+      </p:nvGrpSpPr>
+      <p:grpSpPr>
+        <a:xfrm>
+          <a:off x="0" y="0"/>
+          <a:ext cx="0" cy="0"/>
+          <a:chOff x="0" y="0"/>
+          <a:chExt cx="0" cy="0"/>
+        </a:xfrm>
+      </p:grpSpPr>
+      <p:sp>
+        <p:nvSpPr>
+          <p:cNvPr id="2" name="標題 1">
+            <a:extLst>
+              <a:ext uri="{FF2B5EF4-FFF2-40B4-BE49-F238E27FC236}">
+                <a16:creationId xmlns:a16="http://schemas.microsoft.com/office/drawing/2014/main" id="{F6F8B13A-2133-AFE8-53EF-3B87CF15EB2C}"/>
+              </a:ext>
+            </a:extLst>
+          </p:cNvPr>
+          <p:cNvSpPr>
+            <a:spLocks noGrp="1"/>
+          </p:cNvSpPr>
+          <p:nvPr>
+            <p:ph type="title"/>
+          </p:nvPr>
+        </p:nvSpPr>
+        <p:spPr/>
+        <p:txBody>
+          <a:bodyPr/>
+          <a:lstStyle/>
+          <a:p>
+            <a:r>
+              <a:rPr lang="en-US" altLang="zh-TW" dirty="0"/>
+              <a:t>Proposed Algorithm - </a:t>
+            </a:r>
+            <a:r>
+              <a:rPr lang="en-US" altLang="zh-TW" sz="3200" dirty="0" err="1"/>
+              <a:t>StWL</a:t>
+            </a:r>
+            <a:r>
+              <a:rPr lang="en-US" altLang="zh-TW" sz="3200" dirty="0"/>
+              <a:t> Optimization in GP</a:t>
+            </a:r>
+            <a:endParaRPr lang="zh-TW" altLang="en-US" dirty="0"/>
+          </a:p>
+        </p:txBody>
+      </p:sp>
+      <mc:AlternateContent xmlns:mc="http://schemas.openxmlformats.org/markup-compatibility/2006">
+        <mc:Choice xmlns:a14="http://schemas.microsoft.com/office/drawing/2010/main" Requires="a14">
+          <p:sp>
+            <p:nvSpPr>
+              <p:cNvPr id="3" name="內容版面配置區 2">
+                <a:extLst>
+                  <a:ext uri="{FF2B5EF4-FFF2-40B4-BE49-F238E27FC236}">
+                    <a16:creationId xmlns:a16="http://schemas.microsoft.com/office/drawing/2014/main" id="{30191587-EE37-4405-867D-9259B59A6461}"/>
+                  </a:ext>
+                </a:extLst>
+              </p:cNvPr>
+              <p:cNvSpPr>
+                <a:spLocks noGrp="1"/>
+              </p:cNvSpPr>
+              <p:nvPr>
+                <p:ph idx="1"/>
+              </p:nvPr>
+            </p:nvSpPr>
+            <p:spPr/>
+            <p:txBody>
+              <a:bodyPr>
+                <a:normAutofit/>
+              </a:bodyPr>
+              <a:lstStyle/>
+              <a:p>
+                <a:pPr marL="457200" indent="-457200">
+                  <a:buAutoNum type="arabicParenBoth"/>
+                </a:pPr>
+                <a:r>
+                  <a:rPr lang="en-US" altLang="zh-TW" sz="2200" b="1" dirty="0"/>
+                  <a:t>Differentiable </a:t>
+                </a:r>
+                <a:r>
+                  <a:rPr lang="en-US" altLang="zh-TW" sz="2200" b="1" dirty="0" err="1"/>
+                  <a:t>StWL</a:t>
+                </a:r>
+                <a:r>
+                  <a:rPr lang="en-US" altLang="zh-TW" sz="2200" b="1" dirty="0"/>
+                  <a:t> Approximation</a:t>
+                </a:r>
+              </a:p>
+              <a:p>
+                <a:pPr marL="0" indent="0">
+                  <a:buNone/>
+                </a:pPr>
+                <a:endParaRPr lang="en-US" altLang="zh-TW" sz="400" b="1" i="1" dirty="0">
+                  <a:latin typeface="Cambria Math" panose="02040503050406030204" pitchFamily="18" charset="0"/>
+                </a:endParaRPr>
+              </a:p>
+              <a:p>
+                <a:pPr lvl="1">
+                  <a:lnSpc>
+                    <a:spcPct val="150000"/>
+                  </a:lnSpc>
+                </a:pPr>
+                <a14:m>
+                  <m:oMath xmlns:m="http://schemas.openxmlformats.org/officeDocument/2006/math">
+                    <m:r>
+                      <a:rPr lang="en-US" altLang="zh-TW" sz="2000" b="0" i="1" smtClean="0">
+                        <a:latin typeface="Cambria Math" panose="02040503050406030204" pitchFamily="18" charset="0"/>
+                      </a:rPr>
+                      <m:t>𝑆𝑡𝑊𝐿</m:t>
+                    </m:r>
+                    <m:d>
+                      <m:dPr>
+                        <m:ctrlPr>
+                          <a:rPr lang="en-US" altLang="zh-TW" sz="2000" i="1" smtClean="0">
+                            <a:latin typeface="Cambria Math" panose="02040503050406030204" pitchFamily="18" charset="0"/>
+                          </a:rPr>
+                        </m:ctrlPr>
+                      </m:dPr>
+                      <m:e>
+                        <m:r>
+                          <a:rPr lang="en-US" altLang="zh-TW" sz="2000" b="0" i="1" smtClean="0">
+                            <a:latin typeface="Cambria Math" panose="02040503050406030204" pitchFamily="18" charset="0"/>
+                          </a:rPr>
+                          <m:t>𝑒</m:t>
+                        </m:r>
+                      </m:e>
+                    </m:d>
+                    <m:r>
+                      <a:rPr lang="en-US" altLang="zh-TW" sz="2000" b="0" i="1" smtClean="0">
+                        <a:latin typeface="Cambria Math" panose="02040503050406030204" pitchFamily="18" charset="0"/>
+                      </a:rPr>
+                      <m:t>= </m:t>
+                    </m:r>
+                    <m:nary>
+                      <m:naryPr>
+                        <m:chr m:val="∑"/>
+                        <m:supHide m:val="on"/>
+                        <m:ctrlPr>
+                          <a:rPr lang="en-US" altLang="zh-TW" sz="2000" i="1" smtClean="0">
+                            <a:latin typeface="Cambria Math" panose="02040503050406030204" pitchFamily="18" charset="0"/>
+                          </a:rPr>
+                        </m:ctrlPr>
+                      </m:naryPr>
+                      <m:sub>
+                        <m:r>
+                          <m:rPr>
+                            <m:brk m:alnAt="7"/>
+                          </m:rPr>
+                          <a:rPr lang="en-US" altLang="zh-TW" sz="2000" b="0" i="1" smtClean="0">
+                            <a:latin typeface="Cambria Math" panose="02040503050406030204" pitchFamily="18" charset="0"/>
+                          </a:rPr>
+                          <m:t>𝑖</m:t>
+                        </m:r>
+                        <m:r>
+                          <a:rPr lang="en-US" altLang="zh-TW" sz="2000" b="0" i="1" smtClean="0">
+                            <a:latin typeface="Cambria Math" panose="02040503050406030204" pitchFamily="18" charset="0"/>
+                            <a:ea typeface="Cambria Math" panose="02040503050406030204" pitchFamily="18" charset="0"/>
+                          </a:rPr>
+                          <m:t>∈</m:t>
+                        </m:r>
+                        <m:r>
+                          <a:rPr lang="en-US" altLang="zh-TW" sz="2000" b="0" i="1" smtClean="0">
+                            <a:latin typeface="Cambria Math" panose="02040503050406030204" pitchFamily="18" charset="0"/>
+                            <a:ea typeface="Cambria Math" panose="02040503050406030204" pitchFamily="18" charset="0"/>
+                          </a:rPr>
+                          <m:t>𝐸</m:t>
+                        </m:r>
+                      </m:sub>
+                      <m:sup/>
+                      <m:e>
+                        <m:r>
+                          <a:rPr lang="en-US" altLang="zh-TW" sz="2000" b="0" i="1" smtClean="0">
+                            <a:latin typeface="Cambria Math" panose="02040503050406030204" pitchFamily="18" charset="0"/>
+                          </a:rPr>
+                          <m:t>|</m:t>
+                        </m:r>
+                        <m:sSub>
+                          <m:sSubPr>
+                            <m:ctrlPr>
+                              <a:rPr lang="en-US" altLang="zh-TW" sz="2000" i="1" smtClean="0">
+                                <a:latin typeface="Cambria Math" panose="02040503050406030204" pitchFamily="18" charset="0"/>
+                              </a:rPr>
+                            </m:ctrlPr>
+                          </m:sSubPr>
+                          <m:e>
+                            <m:r>
+                              <a:rPr lang="en-US" altLang="zh-TW" sz="2000" b="0" i="1" smtClean="0">
+                                <a:latin typeface="Cambria Math" panose="02040503050406030204" pitchFamily="18" charset="0"/>
+                              </a:rPr>
+                              <m:t>𝑥</m:t>
+                            </m:r>
+                          </m:e>
+                          <m:sub>
+                            <m:r>
+                              <a:rPr lang="en-US" altLang="zh-TW" sz="2000" b="0" i="1" smtClean="0">
+                                <a:latin typeface="Cambria Math" panose="02040503050406030204" pitchFamily="18" charset="0"/>
+                              </a:rPr>
+                              <m:t>𝑖</m:t>
+                            </m:r>
+                          </m:sub>
+                        </m:sSub>
+                        <m:r>
+                          <a:rPr lang="en-US" altLang="zh-TW" sz="2000" b="0" i="1" smtClean="0">
+                            <a:latin typeface="Cambria Math" panose="02040503050406030204" pitchFamily="18" charset="0"/>
+                          </a:rPr>
+                          <m:t> − </m:t>
+                        </m:r>
+                        <m:sSub>
+                          <m:sSubPr>
+                            <m:ctrlPr>
+                              <a:rPr lang="en-US" altLang="zh-TW" sz="2000" i="1" smtClean="0">
+                                <a:latin typeface="Cambria Math" panose="02040503050406030204" pitchFamily="18" charset="0"/>
+                              </a:rPr>
+                            </m:ctrlPr>
+                          </m:sSubPr>
+                          <m:e>
+                            <m:r>
+                              <a:rPr lang="en-US" altLang="zh-TW" sz="2000" b="0" i="1" smtClean="0">
+                                <a:latin typeface="Cambria Math" panose="02040503050406030204" pitchFamily="18" charset="0"/>
+                              </a:rPr>
+                              <m:t>𝑥</m:t>
+                            </m:r>
+                          </m:e>
+                          <m:sub>
+                            <m:r>
+                              <a:rPr lang="en-US" altLang="zh-TW" sz="2000" b="0" i="1" smtClean="0">
+                                <a:latin typeface="Cambria Math" panose="02040503050406030204" pitchFamily="18" charset="0"/>
+                              </a:rPr>
+                              <m:t>𝑠𝑖</m:t>
+                            </m:r>
+                          </m:sub>
+                        </m:sSub>
+                        <m:r>
+                          <a:rPr lang="en-US" altLang="zh-TW" sz="2000" b="0" i="1" smtClean="0">
+                            <a:latin typeface="Cambria Math" panose="02040503050406030204" pitchFamily="18" charset="0"/>
+                          </a:rPr>
+                          <m:t>|</m:t>
+                        </m:r>
+                      </m:e>
+                    </m:nary>
+                  </m:oMath>
+                </a14:m>
+                <a:endParaRPr lang="en-US" altLang="zh-TW" sz="2000" i="1" dirty="0"/>
+              </a:p>
+              <a:p>
+                <a:pPr lvl="1">
+                  <a:lnSpc>
+                    <a:spcPct val="200000"/>
+                  </a:lnSpc>
+                </a:pPr>
+                <a:r>
+                  <a:rPr lang="en-US" altLang="zh-TW" sz="2000" dirty="0"/>
+                  <a:t>Each segment can be analyzed separately and seen as a 2-pin net.</a:t>
+                </a:r>
+              </a:p>
+              <a:p>
+                <a:pPr lvl="1">
+                  <a:lnSpc>
+                    <a:spcPct val="200000"/>
+                  </a:lnSpc>
+                </a:pPr>
+                <a:r>
+                  <a:rPr lang="en-US" altLang="zh-TW" sz="2000" dirty="0"/>
+                  <a:t>weighted average approximation of horizontal </a:t>
+                </a:r>
+                <a:r>
+                  <a:rPr lang="en-US" altLang="zh-TW" sz="2000" dirty="0" err="1"/>
+                  <a:t>StWL</a:t>
+                </a:r>
+                <a:r>
+                  <a:rPr lang="en-US" altLang="zh-TW" sz="2000" dirty="0"/>
+                  <a:t> for</a:t>
+                </a:r>
+                <a:r>
+                  <a:rPr lang="zh-TW" altLang="en-US" sz="2000" dirty="0"/>
+                  <a:t> </a:t>
+                </a:r>
+                <a:r>
+                  <a:rPr lang="en-US" altLang="zh-TW" sz="2000" dirty="0"/>
+                  <a:t>net e:</a:t>
+                </a:r>
+              </a:p>
+              <a:p>
+                <a:pPr lvl="1">
+                  <a:lnSpc>
+                    <a:spcPct val="150000"/>
+                  </a:lnSpc>
+                </a:pPr>
+                <a:endParaRPr lang="en-US" altLang="zh-TW" sz="800" dirty="0"/>
+              </a:p>
+              <a:p>
+                <a:pPr lvl="1">
+                  <a:lnSpc>
+                    <a:spcPct val="150000"/>
+                  </a:lnSpc>
+                </a:pPr>
+                <a:r>
+                  <a:rPr lang="zh-TW" altLang="en-US" sz="2000" dirty="0"/>
+                  <a:t> </a:t>
+                </a:r>
+                <a:endParaRPr lang="en-US" altLang="zh-TW" sz="2000" dirty="0"/>
+              </a:p>
+            </p:txBody>
+          </p:sp>
+        </mc:Choice>
+        <mc:Fallback>
+          <p:sp>
+            <p:nvSpPr>
+              <p:cNvPr id="3" name="內容版面配置區 2">
+                <a:extLst>
+                  <a:ext uri="{FF2B5EF4-FFF2-40B4-BE49-F238E27FC236}">
+                    <a16:creationId xmlns:a16="http://schemas.microsoft.com/office/drawing/2014/main" id="{30191587-EE37-4405-867D-9259B59A6461}"/>
+                  </a:ext>
+                </a:extLst>
+              </p:cNvPr>
+              <p:cNvSpPr>
+                <a:spLocks noGrp="1" noRot="1" noChangeAspect="1" noMove="1" noResize="1" noEditPoints="1" noAdjustHandles="1" noChangeArrowheads="1" noChangeShapeType="1" noTextEdit="1"/>
+              </p:cNvSpPr>
+              <p:nvPr>
+                <p:ph idx="1"/>
+              </p:nvPr>
+            </p:nvSpPr>
+            <p:spPr>
+              <a:blipFill>
+                <a:blip r:embed="rId3"/>
+                <a:stretch>
+                  <a:fillRect l="-638" t="-1541"/>
+                </a:stretch>
+              </a:blipFill>
+            </p:spPr>
+            <p:txBody>
+              <a:bodyPr/>
+              <a:lstStyle/>
+              <a:p>
+                <a:r>
+                  <a:rPr lang="zh-TW" altLang="en-US">
+                    <a:noFill/>
+                  </a:rPr>
+                  <a:t> </a:t>
+                </a:r>
+              </a:p>
+            </p:txBody>
+          </p:sp>
+        </mc:Fallback>
+      </mc:AlternateContent>
+      <p:sp>
+        <p:nvSpPr>
+          <p:cNvPr id="4" name="投影片編號版面配置區 3">
+            <a:extLst>
+              <a:ext uri="{FF2B5EF4-FFF2-40B4-BE49-F238E27FC236}">
+                <a16:creationId xmlns:a16="http://schemas.microsoft.com/office/drawing/2014/main" id="{D3074287-8483-E349-6EE8-9B7530C8AFD6}"/>
+              </a:ext>
+            </a:extLst>
+          </p:cNvPr>
+          <p:cNvSpPr>
+            <a:spLocks noGrp="1"/>
+          </p:cNvSpPr>
+          <p:nvPr>
+            <p:ph type="sldNum" sz="quarter" idx="12"/>
+          </p:nvPr>
+        </p:nvSpPr>
+        <p:spPr/>
+        <p:txBody>
+          <a:bodyPr/>
+          <a:lstStyle/>
+          <a:p>
+            <a:fld id="{666274A1-CF9C-426A-8DD4-B13ED0C24231}" type="slidenum">
+              <a:rPr lang="en-US" smtClean="0"/>
+              <a:t>8</a:t>
+            </a:fld>
+            <a:endParaRPr lang="en-US"/>
+          </a:p>
+        </p:txBody>
+      </p:sp>
+      <p:sp>
+        <p:nvSpPr>
+          <p:cNvPr id="5" name="文字方塊 4">
+            <a:extLst>
+              <a:ext uri="{FF2B5EF4-FFF2-40B4-BE49-F238E27FC236}">
+                <a16:creationId xmlns:a16="http://schemas.microsoft.com/office/drawing/2014/main" id="{27BE8418-A59F-AD7C-84C6-36AF8D00E011}"/>
               </a:ext>
             </a:extLst>
           </p:cNvPr>
@@ -7997,38 +10951,114 @@
         </p:nvSpPr>
         <p:spPr>
           <a:xfrm>
-            <a:off x="2627743" y="2967335"/>
-            <a:ext cx="6936514" cy="923330"/>
+            <a:off x="7141945" y="1872830"/>
+            <a:ext cx="4494997" cy="891975"/>
           </a:xfrm>
           <a:prstGeom prst="rect">
             <a:avLst/>
           </a:prstGeom>
           <a:noFill/>
+          <a:ln>
+            <a:solidFill>
+              <a:schemeClr val="tx1"/>
+            </a:solidFill>
+          </a:ln>
         </p:spPr>
         <p:txBody>
-          <a:bodyPr wrap="none" rtlCol="0">
+          <a:bodyPr wrap="square" rtlCol="0">
             <a:spAutoFit/>
           </a:bodyPr>
           <a:lstStyle/>
           <a:p>
-            <a:r>
-              <a:rPr lang="en-US" altLang="zh-TW" sz="5400" dirty="0">
-                <a:latin typeface="Times" panose="02020603050405020304" pitchFamily="18" charset="0"/>
-                <a:cs typeface="Times" panose="02020603050405020304" pitchFamily="18" charset="0"/>
-              </a:rPr>
-              <a:t>Thank you for listening!</a:t>
-            </a:r>
-            <a:endParaRPr lang="zh-TW" altLang="en-US" sz="5400" dirty="0">
-              <a:latin typeface="Times" panose="02020603050405020304" pitchFamily="18" charset="0"/>
-              <a:cs typeface="Times" panose="02020603050405020304" pitchFamily="18" charset="0"/>
-            </a:endParaRPr>
-          </a:p>
-        </p:txBody>
-      </p:sp>
+            <a:pPr>
+              <a:lnSpc>
+                <a:spcPct val="150000"/>
+              </a:lnSpc>
+            </a:pPr>
+            <a:r>
+              <a:rPr lang="en-US" altLang="zh-TW" sz="1600" b="1" i="1" dirty="0"/>
+              <a:t>i</a:t>
+            </a:r>
+            <a:r>
+              <a:rPr lang="en-US" altLang="zh-TW" sz="1600" i="1" dirty="0"/>
+              <a:t> </a:t>
+            </a:r>
+            <a:r>
+              <a:rPr lang="en-US" altLang="zh-TW" sz="1600" dirty="0"/>
+              <a:t>:  inner point of net e (include steiner points).</a:t>
+            </a:r>
+          </a:p>
+          <a:p>
+            <a:pPr>
+              <a:lnSpc>
+                <a:spcPct val="150000"/>
+              </a:lnSpc>
+            </a:pPr>
+            <a:r>
+              <a:rPr lang="en-US" altLang="zh-TW" sz="1600" b="1" i="1" dirty="0" err="1"/>
+              <a:t>si</a:t>
+            </a:r>
+            <a:r>
+              <a:rPr lang="en-US" altLang="zh-TW" sz="1600" i="1" dirty="0"/>
+              <a:t> </a:t>
+            </a:r>
+            <a:r>
+              <a:rPr lang="en-US" altLang="zh-TW" sz="1600" dirty="0"/>
+              <a:t>: the parent node of point </a:t>
+            </a:r>
+            <a:r>
+              <a:rPr lang="en-US" altLang="zh-TW" sz="1600" dirty="0" err="1"/>
+              <a:t>i</a:t>
+            </a:r>
+            <a:r>
+              <a:rPr lang="en-US" altLang="zh-TW" sz="1600" dirty="0"/>
+              <a:t>.</a:t>
+            </a:r>
+          </a:p>
+          <a:p>
+            <a:pPr>
+              <a:lnSpc>
+                <a:spcPct val="150000"/>
+              </a:lnSpc>
+            </a:pPr>
+            <a:endParaRPr lang="en-US" altLang="zh-TW" sz="300" dirty="0"/>
+          </a:p>
+        </p:txBody>
+      </p:sp>
+      <p:pic>
+        <p:nvPicPr>
+          <p:cNvPr id="8" name="圖片 7">
+            <a:extLst>
+              <a:ext uri="{FF2B5EF4-FFF2-40B4-BE49-F238E27FC236}">
+                <a16:creationId xmlns:a16="http://schemas.microsoft.com/office/drawing/2014/main" id="{9A464EA8-E95E-16DD-5147-D8A24CB4D3B0}"/>
+              </a:ext>
+            </a:extLst>
+          </p:cNvPr>
+          <p:cNvPicPr>
+            <a:picLocks noChangeAspect="1"/>
+          </p:cNvPicPr>
+          <p:nvPr/>
+        </p:nvPicPr>
+        <p:blipFill>
+          <a:blip r:embed="rId4"/>
+          <a:stretch>
+            <a:fillRect/>
+          </a:stretch>
+        </p:blipFill>
+        <p:spPr>
+          <a:xfrm>
+            <a:off x="1556963" y="4438267"/>
+            <a:ext cx="4855534" cy="1341201"/>
+          </a:xfrm>
+          <a:prstGeom prst="rect">
+            <a:avLst/>
+          </a:prstGeom>
+        </p:spPr>
+      </p:pic>
     </p:spTree>
     <p:extLst>
       <p:ext uri="{BB962C8B-B14F-4D97-AF65-F5344CB8AC3E}">
-        <p14:creationId xmlns:p14="http://schemas.microsoft.com/office/powerpoint/2010/main" val="1947749228"/>
+        <p14:creationId xmlns:p14="http://schemas.microsoft.com/office/powerpoint/2010/main" val="118648045"/>
       </p:ext>
     </p:extLst>
   </p:cSld>

</xml_diff>